<commit_message>
low level vision code and ppt changes
</commit_message>
<xml_diff>
--- a/ComputerVision/Class 02 Image digitization/CV #2 Digital Image, Fundamentals - Aakash.pptx
+++ b/ComputerVision/Class 02 Image digitization/CV #2 Digital Image, Fundamentals - Aakash.pptx
@@ -5,7 +5,7 @@
     <p:sldMasterId id="2147483648" r:id="rId1"/>
   </p:sldMasterIdLst>
   <p:notesMasterIdLst>
-    <p:notesMasterId r:id="rId35"/>
+    <p:notesMasterId r:id="rId32"/>
   </p:notesMasterIdLst>
   <p:sldIdLst>
     <p:sldId id="318" r:id="rId2"/>
@@ -36,11 +36,8 @@
     <p:sldId id="332" r:id="rId27"/>
     <p:sldId id="333" r:id="rId28"/>
     <p:sldId id="334" r:id="rId29"/>
-    <p:sldId id="335" r:id="rId30"/>
-    <p:sldId id="336" r:id="rId31"/>
-    <p:sldId id="337" r:id="rId32"/>
-    <p:sldId id="297" r:id="rId33"/>
-    <p:sldId id="298" r:id="rId34"/>
+    <p:sldId id="297" r:id="rId30"/>
+    <p:sldId id="298" r:id="rId31"/>
   </p:sldIdLst>
   <p:sldSz cx="12192000" cy="6858000"/>
   <p:notesSz cx="6858000" cy="9144000"/>
@@ -278,7 +275,7 @@
       <p15:sldGuideLst xmlns:p15="http://schemas.microsoft.com/office/powerpoint/2012/main"/>
     </p:ext>
     <p:ext uri="GoogleSlidesCustomDataVersion2">
-      <go:slidesCustomData xmlns:go="http://customooxmlschemas.google.com/" xmlns:ahyp="http://schemas.microsoft.com/office/drawing/2018/hyperlinkcolor" xmlns:p15="http://schemas.microsoft.com/office/powerpoint/2012/main" xmlns:p14="http://schemas.microsoft.com/office/powerpoint/2010/main" xmlns:com="http://schemas.openxmlformats.org/drawingml/2006/compatibility" xmlns:pvml="urn:schemas-microsoft-com:office:powerpoint" xmlns:v="urn:schemas-microsoft-com:vml" xmlns:o="urn:schemas-microsoft-com:office:office" xmlns:dgm="http://schemas.openxmlformats.org/drawingml/2006/diagram" xmlns:c="http://schemas.openxmlformats.org/drawingml/2006/chart" xmlns:mv="urn:schemas-microsoft-com:mac:vml" xmlns:mc="http://schemas.openxmlformats.org/markup-compatibility/2006" xmlns="" r:id="rId52" roundtripDataSignature="AMtx7mjyDp/TXpgp/6mAk5w+Yx3MTd0SSQ=="/>
+      <go:slidesCustomData xmlns="" xmlns:mc="http://schemas.openxmlformats.org/markup-compatibility/2006" xmlns:mv="urn:schemas-microsoft-com:mac:vml" xmlns:c="http://schemas.openxmlformats.org/drawingml/2006/chart" xmlns:dgm="http://schemas.openxmlformats.org/drawingml/2006/diagram" xmlns:o="urn:schemas-microsoft-com:office:office" xmlns:v="urn:schemas-microsoft-com:vml" xmlns:pvml="urn:schemas-microsoft-com:office:powerpoint" xmlns:com="http://schemas.openxmlformats.org/drawingml/2006/compatibility" xmlns:p14="http://schemas.microsoft.com/office/powerpoint/2010/main" xmlns:p15="http://schemas.microsoft.com/office/powerpoint/2012/main" xmlns:ahyp="http://schemas.microsoft.com/office/drawing/2018/hyperlinkcolor" xmlns:go="http://customooxmlschemas.google.com/" r:id="rId52" roundtripDataSignature="AMtx7mjyDp/TXpgp/6mAk5w+Yx3MTd0SSQ=="/>
     </p:ext>
   </p:extLst>
 </p:presentation>
@@ -21578,7 +21575,7 @@
   <p:cSld>
     <p:spTree>
       <p:nvGrpSpPr>
-        <p:cNvPr id="1" name=""/>
+        <p:cNvPr id="1" name="Shape 523"/>
         <p:cNvGrpSpPr/>
         <p:nvPr/>
       </p:nvGrpSpPr>
@@ -21592,92 +21589,18 @@
       </p:grpSpPr>
       <p:sp>
         <p:nvSpPr>
-          <p:cNvPr id="2" name="Title 1">
-            <a:extLst>
-              <a:ext uri="{FF2B5EF4-FFF2-40B4-BE49-F238E27FC236}">
-                <a16:creationId xmlns:a16="http://schemas.microsoft.com/office/drawing/2014/main" id="{D0E167E2-DEBD-C080-521F-62CD46CBE7DE}"/>
-              </a:ext>
-            </a:extLst>
-          </p:cNvPr>
-          <p:cNvSpPr>
-            <a:spLocks noGrp="1"/>
-          </p:cNvSpPr>
-          <p:nvPr>
-            <p:ph type="title"/>
-          </p:nvPr>
-        </p:nvSpPr>
-        <p:spPr/>
-        <p:txBody>
-          <a:bodyPr>
-            <a:normAutofit fontScale="90000"/>
-          </a:bodyPr>
-          <a:lstStyle/>
-          <a:p>
-            <a:r>
-              <a:rPr lang="en-US" dirty="0"/>
-              <a:t>Color Image</a:t>
-            </a:r>
-          </a:p>
-        </p:txBody>
-      </p:sp>
-      <p:sp>
-        <p:nvSpPr>
-          <p:cNvPr id="4" name="Slide Number Placeholder 3">
-            <a:extLst>
-              <a:ext uri="{FF2B5EF4-FFF2-40B4-BE49-F238E27FC236}">
-                <a16:creationId xmlns:a16="http://schemas.microsoft.com/office/drawing/2014/main" id="{061CCD84-70AF-E122-2957-D721A249318C}"/>
-              </a:ext>
-            </a:extLst>
-          </p:cNvPr>
-          <p:cNvSpPr>
+          <p:cNvPr id="524" name="Google Shape;524;p67"/>
+          <p:cNvSpPr txBox="1">
             <a:spLocks noGrp="1"/>
           </p:cNvSpPr>
           <p:nvPr>
             <p:ph type="sldNum" idx="12"/>
           </p:nvPr>
         </p:nvSpPr>
-        <p:spPr/>
-        <p:txBody>
-          <a:bodyPr/>
-          <a:lstStyle/>
-          <a:p>
-            <a:pPr marL="0" lvl="0" indent="0" algn="r" rtl="0">
-              <a:spcBef>
-                <a:spcPts val="0"/>
-              </a:spcBef>
-              <a:spcAft>
-                <a:spcPts val="0"/>
-              </a:spcAft>
-              <a:buNone/>
-            </a:pPr>
-            <a:fld id="{00000000-1234-1234-1234-123412341234}" type="slidenum">
-              <a:rPr lang="en-US" smtClean="0"/>
-              <a:t>29</a:t>
-            </a:fld>
-            <a:endParaRPr lang="en-US"/>
-          </a:p>
-        </p:txBody>
-      </p:sp>
-      <p:sp>
-        <p:nvSpPr>
-          <p:cNvPr id="5" name="Rectangle 1">
-            <a:extLst>
-              <a:ext uri="{FF2B5EF4-FFF2-40B4-BE49-F238E27FC236}">
-                <a16:creationId xmlns:a16="http://schemas.microsoft.com/office/drawing/2014/main" id="{0D5F9E42-7DCE-1525-2770-97579E047C3D}"/>
-              </a:ext>
-            </a:extLst>
-          </p:cNvPr>
-          <p:cNvSpPr>
-            <a:spLocks noGrp="1" noChangeArrowheads="1"/>
-          </p:cNvSpPr>
-          <p:nvPr>
-            <p:ph type="body" idx="1"/>
-          </p:nvPr>
-        </p:nvSpPr>
-        <p:spPr bwMode="auto">
+        <p:spPr>
           <a:xfrm>
-            <a:off x="415600" y="1834847"/>
-            <a:ext cx="7701147" cy="3958776"/>
+            <a:off x="8610600" y="6356350"/>
+            <a:ext cx="2743200" cy="365100"/>
           </a:xfrm>
           <a:prstGeom prst="rect">
             <a:avLst/>
@@ -21686,511 +21609,286 @@
           <a:ln>
             <a:noFill/>
           </a:ln>
-          <a:effectLst/>
-          <a:extLst>
-            <a:ext uri="{909E8E84-426E-40DD-AFC4-6F175D3DCCD1}">
-              <a14:hiddenFill xmlns:a14="http://schemas.microsoft.com/office/drawing/2010/main">
-                <a:solidFill>
-                  <a:schemeClr val="accent1"/>
-                </a:solidFill>
-              </a14:hiddenFill>
-            </a:ext>
-            <a:ext uri="{91240B29-F687-4F45-9708-019B960494DF}">
-              <a14:hiddenLine xmlns:a14="http://schemas.microsoft.com/office/drawing/2010/main" w="9525">
-                <a:solidFill>
-                  <a:schemeClr val="tx1"/>
-                </a:solidFill>
-                <a:miter lim="800000"/>
-                <a:headEnd/>
-                <a:tailEnd/>
-              </a14:hiddenLine>
-            </a:ext>
-            <a:ext uri="{AF507438-7753-43E0-B8FC-AC1667EBCBE1}">
-              <a14:hiddenEffects xmlns:a14="http://schemas.microsoft.com/office/drawing/2010/main">
-                <a:effectLst>
-                  <a:outerShdw dist="35921" dir="2700000" algn="ctr" rotWithShape="0">
-                    <a:schemeClr val="bg2"/>
-                  </a:outerShdw>
-                </a:effectLst>
-              </a14:hiddenEffects>
-            </a:ext>
-          </a:extLst>
         </p:spPr>
         <p:txBody>
-          <a:bodyPr vert="horz" wrap="none" lIns="91440" tIns="45720" rIns="91440" bIns="45720" numCol="1" anchor="ctr" anchorCtr="0" compatLnSpc="1">
-            <a:prstTxWarp prst="textNoShape">
-              <a:avLst/>
-            </a:prstTxWarp>
-            <a:spAutoFit/>
+          <a:bodyPr spcFirstLastPara="1" wrap="square" lIns="91425" tIns="45700" rIns="91425" bIns="45700" anchor="ctr" anchorCtr="0">
+            <a:noAutofit/>
           </a:bodyPr>
           <a:lstStyle/>
           <a:p>
-            <a:pPr marL="0" marR="0" lvl="0" indent="0" algn="l" defTabSz="914400" rtl="0" eaLnBrk="0" fontAlgn="base" latinLnBrk="0" hangingPunct="0">
-              <a:lnSpc>
-                <a:spcPct val="100000"/>
-              </a:lnSpc>
-              <a:spcBef>
-                <a:spcPct val="0"/>
-              </a:spcBef>
-              <a:spcAft>
-                <a:spcPct val="0"/>
-              </a:spcAft>
-              <a:buClrTx/>
-              <a:buSzTx/>
-              <a:buFontTx/>
-              <a:buChar char="•"/>
-              <a:tabLst/>
+            <a:pPr marL="0" lvl="0" indent="0" algn="r" rtl="0">
+              <a:spcBef>
+                <a:spcPts val="0"/>
+              </a:spcBef>
+              <a:spcAft>
+                <a:spcPts val="0"/>
+              </a:spcAft>
+              <a:buClr>
+                <a:srgbClr val="000000"/>
+              </a:buClr>
+              <a:buSzPts val="900"/>
+              <a:buFont typeface="Arial"/>
+              <a:buNone/>
             </a:pPr>
-            <a:r>
-              <a:rPr kumimoji="0" lang="en-US" altLang="en-US" sz="1500" b="0" i="0" u="none" strike="noStrike" cap="none" normalizeH="0" baseline="0" dirty="0">
-                <a:ln>
-                  <a:noFill/>
-                </a:ln>
-                <a:solidFill>
-                  <a:schemeClr val="tx1"/>
-                </a:solidFill>
-                <a:effectLst/>
-                <a:latin typeface="Arial" panose="020B0604020202020204" pitchFamily="34" charset="0"/>
+            <a:fld id="{00000000-1234-1234-1234-123412341234}" type="slidenum">
+              <a:rPr lang="en-US" sz="900">
+                <a:solidFill>
+                  <a:srgbClr val="888888"/>
+                </a:solidFill>
+                <a:latin typeface="Calibri"/>
+                <a:ea typeface="Calibri"/>
+                <a:cs typeface="Calibri"/>
+                <a:sym typeface="Calibri"/>
               </a:rPr>
-              <a:t>A color image is composed of </a:t>
-            </a:r>
-            <a:r>
-              <a:rPr kumimoji="0" lang="en-US" altLang="en-US" sz="1500" b="1" i="0" u="none" strike="noStrike" cap="none" normalizeH="0" baseline="0" dirty="0">
-                <a:ln>
-                  <a:noFill/>
-                </a:ln>
-                <a:solidFill>
-                  <a:schemeClr val="tx1"/>
-                </a:solidFill>
-                <a:effectLst/>
-                <a:latin typeface="Arial" panose="020B0604020202020204" pitchFamily="34" charset="0"/>
+              <a:t>29</a:t>
+            </a:fld>
+            <a:endParaRPr sz="900">
+              <a:solidFill>
+                <a:srgbClr val="888888"/>
+              </a:solidFill>
+              <a:latin typeface="Calibri"/>
+              <a:ea typeface="Calibri"/>
+              <a:cs typeface="Calibri"/>
+              <a:sym typeface="Calibri"/>
+            </a:endParaRPr>
+          </a:p>
+        </p:txBody>
+      </p:sp>
+      <p:sp>
+        <p:nvSpPr>
+          <p:cNvPr id="525" name="Google Shape;525;p67"/>
+          <p:cNvSpPr txBox="1">
+            <a:spLocks noGrp="1"/>
+          </p:cNvSpPr>
+          <p:nvPr>
+            <p:ph type="body" idx="1"/>
+          </p:nvPr>
+        </p:nvSpPr>
+        <p:spPr>
+          <a:xfrm>
+            <a:off x="838200" y="1632858"/>
+            <a:ext cx="10515600" cy="4441500"/>
+          </a:xfrm>
+          <a:prstGeom prst="rect">
+            <a:avLst/>
+          </a:prstGeom>
+          <a:noFill/>
+          <a:ln>
+            <a:noFill/>
+          </a:ln>
+        </p:spPr>
+        <p:txBody>
+          <a:bodyPr spcFirstLastPara="1" wrap="square" lIns="91425" tIns="45700" rIns="91425" bIns="45700" anchor="t" anchorCtr="0">
+            <a:normAutofit/>
+          </a:bodyPr>
+          <a:lstStyle/>
+          <a:p>
+            <a:pPr marL="457200" lvl="0" indent="0" algn="l" rtl="0">
+              <a:lnSpc>
+                <a:spcPct val="100000"/>
+              </a:lnSpc>
+              <a:spcBef>
+                <a:spcPts val="1000"/>
+              </a:spcBef>
+              <a:spcAft>
+                <a:spcPts val="0"/>
+              </a:spcAft>
+              <a:buNone/>
+            </a:pPr>
+            <a:r>
+              <a:rPr lang="en-US" dirty="0"/>
+              <a:t>Digital Image Processing, Rafael C. Gonzalez &amp; Richard E woods, Third Ed, Chapter 2</a:t>
+            </a:r>
+            <a:endParaRPr dirty="0"/>
+          </a:p>
+          <a:p>
+            <a:pPr marL="914400" lvl="1" indent="-228600" algn="l" rtl="0">
+              <a:lnSpc>
+                <a:spcPct val="90000"/>
+              </a:lnSpc>
+              <a:spcBef>
+                <a:spcPts val="500"/>
+              </a:spcBef>
+              <a:spcAft>
+                <a:spcPts val="0"/>
+              </a:spcAft>
+              <a:buSzPct val="100000"/>
+              <a:buNone/>
+            </a:pPr>
+            <a:endParaRPr dirty="0"/>
+          </a:p>
+          <a:p>
+            <a:pPr marL="914400" lvl="1" indent="-228600" algn="l" rtl="0">
+              <a:lnSpc>
+                <a:spcPct val="90000"/>
+              </a:lnSpc>
+              <a:spcBef>
+                <a:spcPts val="500"/>
+              </a:spcBef>
+              <a:spcAft>
+                <a:spcPts val="0"/>
+              </a:spcAft>
+              <a:buSzPct val="100000"/>
+              <a:buNone/>
+            </a:pPr>
+            <a:endParaRPr dirty="0"/>
+          </a:p>
+          <a:p>
+            <a:pPr marL="914400" lvl="1" indent="-228600" algn="l" rtl="0">
+              <a:lnSpc>
+                <a:spcPct val="90000"/>
+              </a:lnSpc>
+              <a:spcBef>
+                <a:spcPts val="500"/>
+              </a:spcBef>
+              <a:spcAft>
+                <a:spcPts val="0"/>
+              </a:spcAft>
+              <a:buSzPct val="100000"/>
+              <a:buNone/>
+            </a:pPr>
+            <a:endParaRPr dirty="0"/>
+          </a:p>
+          <a:p>
+            <a:pPr marL="0" lvl="1" indent="0" algn="l" rtl="0">
+              <a:lnSpc>
+                <a:spcPct val="90000"/>
+              </a:lnSpc>
+              <a:spcBef>
+                <a:spcPts val="500"/>
+              </a:spcBef>
+              <a:spcAft>
+                <a:spcPts val="0"/>
+              </a:spcAft>
+              <a:buSzPct val="100000"/>
+              <a:buNone/>
+            </a:pPr>
+            <a:r>
+              <a:rPr lang="en-US" b="1" dirty="0">
+                <a:solidFill>
+                  <a:schemeClr val="dk1"/>
+                </a:solidFill>
               </a:rPr>
-              <a:t>multiple channels</a:t>
-            </a:r>
-            <a:r>
-              <a:rPr kumimoji="0" lang="en-US" altLang="en-US" sz="1500" b="0" i="0" u="none" strike="noStrike" cap="none" normalizeH="0" baseline="0" dirty="0">
-                <a:ln>
-                  <a:noFill/>
-                </a:ln>
-                <a:solidFill>
-                  <a:schemeClr val="tx1"/>
-                </a:solidFill>
-                <a:effectLst/>
-                <a:latin typeface="Arial" panose="020B0604020202020204" pitchFamily="34" charset="0"/>
-              </a:rPr>
-              <a:t> — typically </a:t>
-            </a:r>
-            <a:r>
-              <a:rPr kumimoji="0" lang="en-US" altLang="en-US" sz="1500" b="1" i="0" u="none" strike="noStrike" cap="none" normalizeH="0" baseline="0" dirty="0">
-                <a:ln>
-                  <a:noFill/>
-                </a:ln>
-                <a:solidFill>
-                  <a:schemeClr val="tx1"/>
-                </a:solidFill>
-                <a:effectLst/>
-                <a:latin typeface="Arial" panose="020B0604020202020204" pitchFamily="34" charset="0"/>
-              </a:rPr>
-              <a:t>Red, Green, Blue (RGB)</a:t>
-            </a:r>
-            <a:r>
-              <a:rPr kumimoji="0" lang="en-US" altLang="en-US" sz="1500" b="0" i="0" u="none" strike="noStrike" cap="none" normalizeH="0" baseline="0" dirty="0">
-                <a:ln>
-                  <a:noFill/>
-                </a:ln>
-                <a:solidFill>
-                  <a:schemeClr val="tx1"/>
-                </a:solidFill>
-                <a:effectLst/>
-                <a:latin typeface="Arial" panose="020B0604020202020204" pitchFamily="34" charset="0"/>
-              </a:rPr>
-              <a:t>.</a:t>
-            </a:r>
-          </a:p>
-          <a:p>
-            <a:pPr marL="0" marR="0" lvl="0" indent="0" algn="l" defTabSz="914400" rtl="0" eaLnBrk="0" fontAlgn="base" latinLnBrk="0" hangingPunct="0">
-              <a:lnSpc>
-                <a:spcPct val="100000"/>
-              </a:lnSpc>
-              <a:spcBef>
-                <a:spcPct val="0"/>
-              </a:spcBef>
-              <a:spcAft>
-                <a:spcPct val="0"/>
-              </a:spcAft>
-              <a:buClrTx/>
-              <a:buSzTx/>
-              <a:buFontTx/>
-              <a:buChar char="•"/>
-              <a:tabLst/>
-            </a:pPr>
-            <a:r>
-              <a:rPr kumimoji="0" lang="en-US" altLang="en-US" sz="1500" b="0" i="0" u="none" strike="noStrike" cap="none" normalizeH="0" baseline="0" dirty="0">
-                <a:ln>
-                  <a:noFill/>
-                </a:ln>
-                <a:solidFill>
-                  <a:schemeClr val="tx1"/>
-                </a:solidFill>
-                <a:effectLst/>
-                <a:latin typeface="Arial" panose="020B0604020202020204" pitchFamily="34" charset="0"/>
-              </a:rPr>
-              <a:t>Each pixel has </a:t>
-            </a:r>
-            <a:r>
-              <a:rPr kumimoji="0" lang="en-US" altLang="en-US" sz="1500" b="1" i="0" u="none" strike="noStrike" cap="none" normalizeH="0" baseline="0" dirty="0">
-                <a:ln>
-                  <a:noFill/>
-                </a:ln>
-                <a:solidFill>
-                  <a:schemeClr val="tx1"/>
-                </a:solidFill>
-                <a:effectLst/>
-                <a:latin typeface="Arial" panose="020B0604020202020204" pitchFamily="34" charset="0"/>
-              </a:rPr>
-              <a:t>three intensity values</a:t>
-            </a:r>
-            <a:r>
-              <a:rPr kumimoji="0" lang="en-US" altLang="en-US" sz="1500" b="0" i="0" u="none" strike="noStrike" cap="none" normalizeH="0" baseline="0" dirty="0">
-                <a:ln>
-                  <a:noFill/>
-                </a:ln>
-                <a:solidFill>
-                  <a:schemeClr val="tx1"/>
-                </a:solidFill>
-                <a:effectLst/>
-                <a:latin typeface="Arial" panose="020B0604020202020204" pitchFamily="34" charset="0"/>
-              </a:rPr>
-              <a:t>: one for each channel.</a:t>
-            </a:r>
-          </a:p>
-          <a:p>
-            <a:pPr marL="0" marR="0" lvl="0" indent="0" algn="l" defTabSz="914400" rtl="0" eaLnBrk="0" fontAlgn="base" latinLnBrk="0" hangingPunct="0">
-              <a:lnSpc>
-                <a:spcPct val="100000"/>
-              </a:lnSpc>
-              <a:spcBef>
-                <a:spcPct val="0"/>
-              </a:spcBef>
-              <a:spcAft>
-                <a:spcPct val="0"/>
-              </a:spcAft>
-              <a:buClrTx/>
-              <a:buSzTx/>
-              <a:buFontTx/>
-              <a:buChar char="•"/>
-              <a:tabLst/>
-            </a:pPr>
-            <a:r>
-              <a:rPr kumimoji="0" lang="en-US" altLang="en-US" sz="1500" b="0" i="0" u="none" strike="noStrike" cap="none" normalizeH="0" baseline="0" dirty="0">
-                <a:ln>
-                  <a:noFill/>
-                </a:ln>
-                <a:solidFill>
-                  <a:schemeClr val="tx1"/>
-                </a:solidFill>
-                <a:effectLst/>
-                <a:latin typeface="Arial" panose="020B0604020202020204" pitchFamily="34" charset="0"/>
-              </a:rPr>
-              <a:t>Together, they define the color at that pixel.</a:t>
-            </a:r>
-          </a:p>
-          <a:p>
-            <a:pPr marL="0" marR="0" lvl="0" indent="0" algn="l" defTabSz="914400" rtl="0" eaLnBrk="0" fontAlgn="base" latinLnBrk="0" hangingPunct="0">
-              <a:lnSpc>
-                <a:spcPct val="100000"/>
-              </a:lnSpc>
-              <a:spcBef>
-                <a:spcPct val="0"/>
-              </a:spcBef>
-              <a:spcAft>
-                <a:spcPct val="0"/>
-              </a:spcAft>
-              <a:buClrTx/>
-              <a:buSzTx/>
-              <a:buNone/>
-              <a:tabLst/>
-            </a:pPr>
-            <a:endParaRPr kumimoji="0" lang="en-US" altLang="en-US" sz="1500" b="0" i="0" u="none" strike="noStrike" cap="none" normalizeH="0" baseline="0" dirty="0">
-              <a:ln>
-                <a:noFill/>
-              </a:ln>
+              <a:t>References for hands-on work:</a:t>
+            </a:r>
+            <a:endParaRPr b="1" dirty="0">
               <a:solidFill>
-                <a:schemeClr val="tx1"/>
+                <a:schemeClr val="dk1"/>
               </a:solidFill>
-              <a:effectLst/>
-              <a:latin typeface="Arial" panose="020B0604020202020204" pitchFamily="34" charset="0"/>
             </a:endParaRPr>
           </a:p>
           <a:p>
-            <a:pPr marL="0" marR="0" lvl="0" indent="0" algn="l" defTabSz="914400" rtl="0" eaLnBrk="0" fontAlgn="base" latinLnBrk="0" hangingPunct="0">
-              <a:lnSpc>
-                <a:spcPct val="100000"/>
-              </a:lnSpc>
-              <a:spcBef>
-                <a:spcPct val="0"/>
-              </a:spcBef>
-              <a:spcAft>
-                <a:spcPct val="0"/>
-              </a:spcAft>
-              <a:buClrTx/>
-              <a:buSzTx/>
-              <a:buNone/>
-              <a:tabLst/>
-            </a:pPr>
-            <a:r>
-              <a:rPr kumimoji="0" lang="en-US" altLang="en-US" sz="1500" b="0" i="0" u="none" strike="noStrike" cap="none" normalizeH="0" baseline="0" dirty="0">
-                <a:ln>
-                  <a:noFill/>
-                </a:ln>
-                <a:solidFill>
-                  <a:schemeClr val="tx1"/>
-                </a:solidFill>
-                <a:effectLst/>
-                <a:latin typeface="Arial" panose="020B0604020202020204" pitchFamily="34" charset="0"/>
-              </a:rPr>
-              <a:t>📌 Example:</a:t>
-            </a:r>
-          </a:p>
-          <a:p>
-            <a:pPr marL="0" marR="0" lvl="0" indent="0" algn="l" defTabSz="914400" rtl="0" eaLnBrk="0" fontAlgn="base" latinLnBrk="0" hangingPunct="0">
-              <a:lnSpc>
-                <a:spcPct val="100000"/>
-              </a:lnSpc>
-              <a:spcBef>
-                <a:spcPct val="0"/>
-              </a:spcBef>
-              <a:spcAft>
-                <a:spcPct val="0"/>
-              </a:spcAft>
-              <a:buClrTx/>
-              <a:buSzTx/>
-              <a:buNone/>
-              <a:tabLst/>
-            </a:pPr>
-            <a:endParaRPr kumimoji="0" lang="en-US" altLang="en-US" sz="1500" b="0" i="0" u="none" strike="noStrike" cap="none" normalizeH="0" baseline="0" dirty="0">
-              <a:ln>
-                <a:noFill/>
-              </a:ln>
-              <a:solidFill>
-                <a:schemeClr val="tx1"/>
-              </a:solidFill>
-              <a:effectLst/>
-              <a:latin typeface="Arial" panose="020B0604020202020204" pitchFamily="34" charset="0"/>
-            </a:endParaRPr>
-          </a:p>
-          <a:p>
-            <a:pPr marL="0" marR="0" lvl="0" indent="0" algn="l" defTabSz="914400" rtl="0" eaLnBrk="0" fontAlgn="base" latinLnBrk="0" hangingPunct="0">
-              <a:lnSpc>
-                <a:spcPct val="100000"/>
-              </a:lnSpc>
-              <a:spcBef>
-                <a:spcPct val="0"/>
-              </a:spcBef>
-              <a:spcAft>
-                <a:spcPct val="0"/>
-              </a:spcAft>
-              <a:buClrTx/>
-              <a:buSzTx/>
-              <a:buNone/>
-              <a:tabLst/>
-            </a:pPr>
-            <a:r>
-              <a:rPr kumimoji="0" lang="en-US" altLang="en-US" sz="1500" b="0" i="0" u="none" strike="noStrike" cap="none" normalizeH="0" baseline="0" dirty="0">
-                <a:ln>
-                  <a:noFill/>
-                </a:ln>
-                <a:solidFill>
-                  <a:schemeClr val="tx1"/>
-                </a:solidFill>
-                <a:effectLst/>
-                <a:latin typeface="Arial" panose="020B0604020202020204" pitchFamily="34" charset="0"/>
-              </a:rPr>
-              <a:t>A pixel in grayscale might be 128</a:t>
-            </a:r>
-          </a:p>
-          <a:p>
-            <a:pPr marL="0" marR="0" lvl="0" indent="0" algn="l" defTabSz="914400" rtl="0" eaLnBrk="0" fontAlgn="base" latinLnBrk="0" hangingPunct="0">
-              <a:lnSpc>
-                <a:spcPct val="100000"/>
-              </a:lnSpc>
-              <a:spcBef>
-                <a:spcPct val="0"/>
-              </a:spcBef>
-              <a:spcAft>
-                <a:spcPct val="0"/>
-              </a:spcAft>
-              <a:buClrTx/>
-              <a:buSzTx/>
-              <a:buNone/>
-              <a:tabLst/>
-            </a:pPr>
-            <a:endParaRPr kumimoji="0" lang="en-US" altLang="en-US" sz="1500" b="0" i="0" u="none" strike="noStrike" cap="none" normalizeH="0" baseline="0" dirty="0">
-              <a:ln>
-                <a:noFill/>
-              </a:ln>
-              <a:solidFill>
-                <a:schemeClr val="tx1"/>
-              </a:solidFill>
-              <a:effectLst/>
-              <a:latin typeface="Arial" panose="020B0604020202020204" pitchFamily="34" charset="0"/>
-            </a:endParaRPr>
-          </a:p>
-          <a:p>
-            <a:pPr marL="0" marR="0" lvl="0" indent="0" algn="l" defTabSz="914400" rtl="0" eaLnBrk="0" fontAlgn="base" latinLnBrk="0" hangingPunct="0">
-              <a:lnSpc>
-                <a:spcPct val="100000"/>
-              </a:lnSpc>
-              <a:spcBef>
-                <a:spcPct val="0"/>
-              </a:spcBef>
-              <a:spcAft>
-                <a:spcPct val="0"/>
-              </a:spcAft>
-              <a:buClrTx/>
-              <a:buSzTx/>
-              <a:buNone/>
-              <a:tabLst/>
-            </a:pPr>
-            <a:r>
-              <a:rPr kumimoji="0" lang="en-US" altLang="en-US" sz="1500" b="0" i="0" u="none" strike="noStrike" cap="none" normalizeH="0" baseline="0" dirty="0">
-                <a:ln>
-                  <a:noFill/>
-                </a:ln>
-                <a:solidFill>
-                  <a:schemeClr val="tx1"/>
-                </a:solidFill>
-                <a:effectLst/>
-                <a:latin typeface="Arial" panose="020B0604020202020204" pitchFamily="34" charset="0"/>
-              </a:rPr>
-              <a:t>A pixel in color might be (123, 85, 200) — Red=123, Green=85, Blue=200</a:t>
-            </a:r>
-            <a:endParaRPr lang="en-US" altLang="en-US" sz="1500" dirty="0">
-              <a:solidFill>
-                <a:schemeClr val="tx1"/>
-              </a:solidFill>
-              <a:latin typeface="Arial" panose="020B0604020202020204" pitchFamily="34" charset="0"/>
-            </a:endParaRPr>
-          </a:p>
-          <a:p>
-            <a:pPr marL="0" marR="0" lvl="0" indent="0" algn="l" defTabSz="914400" rtl="0" eaLnBrk="0" fontAlgn="base" latinLnBrk="0" hangingPunct="0">
-              <a:lnSpc>
-                <a:spcPct val="100000"/>
-              </a:lnSpc>
-              <a:spcBef>
-                <a:spcPct val="0"/>
-              </a:spcBef>
-              <a:spcAft>
-                <a:spcPct val="0"/>
-              </a:spcAft>
-              <a:buClrTx/>
-              <a:buSzTx/>
-              <a:buNone/>
-              <a:tabLst/>
-            </a:pPr>
-            <a:endParaRPr kumimoji="0" lang="en-US" altLang="en-US" sz="1500" b="0" i="0" u="none" strike="noStrike" cap="none" normalizeH="0" baseline="0" dirty="0">
-              <a:ln>
-                <a:noFill/>
-              </a:ln>
-              <a:solidFill>
-                <a:schemeClr val="tx1"/>
-              </a:solidFill>
-              <a:effectLst/>
-              <a:latin typeface="Arial" panose="020B0604020202020204" pitchFamily="34" charset="0"/>
-            </a:endParaRPr>
-          </a:p>
-          <a:p>
-            <a:pPr>
-              <a:buNone/>
-            </a:pPr>
-            <a:r>
-              <a:rPr lang="en-US" sz="1500" dirty="0"/>
-              <a:t>Think of RGB like </a:t>
-            </a:r>
-            <a:r>
-              <a:rPr lang="en-US" sz="1500" b="1" dirty="0"/>
-              <a:t>mixing paints</a:t>
-            </a:r>
-            <a:r>
-              <a:rPr lang="en-US" sz="1500" dirty="0"/>
-              <a:t>:</a:t>
-            </a:r>
-          </a:p>
-          <a:p>
-            <a:pPr>
-              <a:buFont typeface="Arial" panose="020B0604020202020204" pitchFamily="34" charset="0"/>
+            <a:pPr marL="457200" lvl="0" indent="-393065" algn="l" rtl="0">
+              <a:lnSpc>
+                <a:spcPct val="90000"/>
+              </a:lnSpc>
+              <a:spcBef>
+                <a:spcPts val="0"/>
+              </a:spcBef>
+              <a:spcAft>
+                <a:spcPts val="0"/>
+              </a:spcAft>
+              <a:buSzPct val="100000"/>
               <a:buChar char="•"/>
             </a:pPr>
             <a:r>
-              <a:rPr lang="en-US" sz="1500" dirty="0"/>
-              <a:t>Red + Green = Yellow</a:t>
-            </a:r>
-          </a:p>
-          <a:p>
-            <a:pPr>
-              <a:buFont typeface="Arial" panose="020B0604020202020204" pitchFamily="34" charset="0"/>
-              <a:buChar char="•"/>
+              <a:rPr lang="en-US" u="sng">
+                <a:solidFill>
+                  <a:schemeClr val="hlink"/>
+                </a:solidFill>
+                <a:hlinkClick r:id="rId3"/>
+              </a:rPr>
+              <a:t>https</a:t>
+            </a:r>
+            <a:r>
+              <a:rPr lang="en-US" u="sng" dirty="0">
+                <a:solidFill>
+                  <a:schemeClr val="hlink"/>
+                </a:solidFill>
+                <a:hlinkClick r:id="rId3"/>
+              </a:rPr>
+              <a:t>://www.kaggle.com/code/gauravduttakiit</a:t>
+            </a:r>
+            <a:r>
+              <a:rPr lang="en-US" u="sng">
+                <a:solidFill>
+                  <a:schemeClr val="hlink"/>
+                </a:solidFill>
+                <a:hlinkClick r:id="rId3"/>
+              </a:rPr>
+              <a:t>/image-processing-notebook</a:t>
+            </a:r>
+            <a:endParaRPr dirty="0"/>
+          </a:p>
+          <a:p>
+            <a:pPr marL="50800" lvl="0" indent="0" algn="l" rtl="0">
+              <a:lnSpc>
+                <a:spcPct val="100000"/>
+              </a:lnSpc>
+              <a:spcBef>
+                <a:spcPts val="1000"/>
+              </a:spcBef>
+              <a:spcAft>
+                <a:spcPts val="0"/>
+              </a:spcAft>
+              <a:buSzPct val="100000"/>
+              <a:buNone/>
             </a:pPr>
-            <a:r>
-              <a:rPr lang="en-US" sz="1500" dirty="0"/>
-              <a:t>Red + Blue = Magenta</a:t>
-            </a:r>
-          </a:p>
-          <a:p>
-            <a:pPr>
-              <a:buFont typeface="Arial" panose="020B0604020202020204" pitchFamily="34" charset="0"/>
-              <a:buChar char="•"/>
+            <a:endParaRPr dirty="0"/>
+          </a:p>
+        </p:txBody>
+      </p:sp>
+      <p:sp>
+        <p:nvSpPr>
+          <p:cNvPr id="526" name="Google Shape;526;p67"/>
+          <p:cNvSpPr txBox="1">
+            <a:spLocks noGrp="1"/>
+          </p:cNvSpPr>
+          <p:nvPr>
+            <p:ph type="title"/>
+          </p:nvPr>
+        </p:nvSpPr>
+        <p:spPr>
+          <a:xfrm>
+            <a:off x="838200" y="365126"/>
+            <a:ext cx="10200000" cy="1027800"/>
+          </a:xfrm>
+          <a:prstGeom prst="rect">
+            <a:avLst/>
+          </a:prstGeom>
+        </p:spPr>
+        <p:txBody>
+          <a:bodyPr spcFirstLastPara="1" wrap="square" lIns="91425" tIns="45700" rIns="91425" bIns="45700" anchor="ctr" anchorCtr="0">
+            <a:normAutofit/>
+          </a:bodyPr>
+          <a:lstStyle/>
+          <a:p>
+            <a:pPr marL="457200" lvl="0" indent="0" algn="l" rtl="0">
+              <a:lnSpc>
+                <a:spcPct val="100000"/>
+              </a:lnSpc>
+              <a:spcBef>
+                <a:spcPts val="1000"/>
+              </a:spcBef>
+              <a:spcAft>
+                <a:spcPts val="0"/>
+              </a:spcAft>
+              <a:buNone/>
             </a:pPr>
             <a:r>
-              <a:rPr lang="en-US" sz="1500" dirty="0"/>
-              <a:t>All = White</a:t>
-            </a:r>
-          </a:p>
-          <a:p>
-            <a:pPr>
-              <a:buFont typeface="Arial" panose="020B0604020202020204" pitchFamily="34" charset="0"/>
-              <a:buChar char="•"/>
-            </a:pPr>
-            <a:r>
-              <a:rPr lang="en-US" sz="1500" dirty="0"/>
-              <a:t>None = Black</a:t>
-            </a:r>
-          </a:p>
-          <a:p>
-            <a:pPr marL="0" marR="0" lvl="0" indent="0" algn="l" defTabSz="914400" rtl="0" eaLnBrk="0" fontAlgn="base" latinLnBrk="0" hangingPunct="0">
-              <a:lnSpc>
-                <a:spcPct val="100000"/>
-              </a:lnSpc>
-              <a:spcBef>
-                <a:spcPct val="0"/>
-              </a:spcBef>
-              <a:spcAft>
-                <a:spcPct val="0"/>
-              </a:spcAft>
-              <a:buClrTx/>
-              <a:buSzTx/>
-              <a:buNone/>
-              <a:tabLst/>
-            </a:pPr>
-            <a:endParaRPr kumimoji="0" lang="en-US" altLang="en-US" sz="1500" b="0" i="0" u="none" strike="noStrike" cap="none" normalizeH="0" baseline="0" dirty="0">
-              <a:ln>
-                <a:noFill/>
-              </a:ln>
-              <a:solidFill>
-                <a:schemeClr val="tx1"/>
-              </a:solidFill>
-              <a:effectLst/>
-              <a:latin typeface="Arial" panose="020B0604020202020204" pitchFamily="34" charset="0"/>
-            </a:endParaRPr>
+              <a:rPr lang="en-US">
+                <a:latin typeface="Arial"/>
+                <a:ea typeface="Arial"/>
+                <a:cs typeface="Arial"/>
+                <a:sym typeface="Arial"/>
+              </a:rPr>
+              <a:t>Readings:</a:t>
+            </a:r>
+            <a:endParaRPr/>
           </a:p>
         </p:txBody>
       </p:sp>
     </p:spTree>
-    <p:extLst>
-      <p:ext uri="{BB962C8B-B14F-4D97-AF65-F5344CB8AC3E}">
-        <p14:creationId xmlns:p14="http://schemas.microsoft.com/office/powerpoint/2010/main" val="3995874424"/>
-      </p:ext>
-    </p:extLst>
   </p:cSld>
   <p:clrMapOvr>
     <a:masterClrMapping/>
@@ -22411,1821 +22109,6 @@
   <p:cSld>
     <p:spTree>
       <p:nvGrpSpPr>
-        <p:cNvPr id="1" name=""/>
-        <p:cNvGrpSpPr/>
-        <p:nvPr/>
-      </p:nvGrpSpPr>
-      <p:grpSpPr>
-        <a:xfrm>
-          <a:off x="0" y="0"/>
-          <a:ext cx="0" cy="0"/>
-          <a:chOff x="0" y="0"/>
-          <a:chExt cx="0" cy="0"/>
-        </a:xfrm>
-      </p:grpSpPr>
-      <p:sp>
-        <p:nvSpPr>
-          <p:cNvPr id="2" name="Title 1">
-            <a:extLst>
-              <a:ext uri="{FF2B5EF4-FFF2-40B4-BE49-F238E27FC236}">
-                <a16:creationId xmlns:a16="http://schemas.microsoft.com/office/drawing/2014/main" id="{14630485-A5FB-3651-86BA-5CDF03FE0C4D}"/>
-              </a:ext>
-            </a:extLst>
-          </p:cNvPr>
-          <p:cNvSpPr>
-            <a:spLocks noGrp="1"/>
-          </p:cNvSpPr>
-          <p:nvPr>
-            <p:ph type="title"/>
-          </p:nvPr>
-        </p:nvSpPr>
-        <p:spPr>
-          <a:xfrm>
-            <a:off x="354000" y="1644233"/>
-            <a:ext cx="5393700" cy="1976400"/>
-          </a:xfrm>
-        </p:spPr>
-        <p:txBody>
-          <a:bodyPr wrap="square" anchor="b">
-            <a:normAutofit/>
-          </a:bodyPr>
-          <a:lstStyle/>
-          <a:p>
-            <a:r>
-              <a:rPr lang="en-US" sz="5200"/>
-              <a:t>HSV : Hue-Saturation-Value</a:t>
-            </a:r>
-          </a:p>
-        </p:txBody>
-      </p:sp>
-      <p:sp>
-        <p:nvSpPr>
-          <p:cNvPr id="3" name="Text Placeholder 2">
-            <a:extLst>
-              <a:ext uri="{FF2B5EF4-FFF2-40B4-BE49-F238E27FC236}">
-                <a16:creationId xmlns:a16="http://schemas.microsoft.com/office/drawing/2014/main" id="{64045E7D-C6C1-DF0B-90AE-1ACAA812658A}"/>
-              </a:ext>
-            </a:extLst>
-          </p:cNvPr>
-          <p:cNvSpPr>
-            <a:spLocks noGrp="1"/>
-          </p:cNvSpPr>
-          <p:nvPr>
-            <p:ph type="body" idx="2"/>
-          </p:nvPr>
-        </p:nvSpPr>
-        <p:spPr>
-          <a:xfrm>
-            <a:off x="6586000" y="965433"/>
-            <a:ext cx="5115900" cy="4926900"/>
-          </a:xfrm>
-        </p:spPr>
-        <p:txBody>
-          <a:bodyPr wrap="square" anchor="ctr">
-            <a:normAutofit/>
-          </a:bodyPr>
-          <a:lstStyle/>
-          <a:p>
-            <a:pPr>
-              <a:lnSpc>
-                <a:spcPct val="105000"/>
-              </a:lnSpc>
-              <a:spcAft>
-                <a:spcPts val="600"/>
-              </a:spcAft>
-              <a:buFont typeface="Arial" panose="020B0604020202020204" pitchFamily="34" charset="0"/>
-              <a:buChar char="•"/>
-            </a:pPr>
-            <a:r>
-              <a:rPr lang="en-US" sz="1000" b="1" dirty="0"/>
-              <a:t>Hue</a:t>
-            </a:r>
-            <a:r>
-              <a:rPr lang="en-US" sz="1000" dirty="0"/>
-              <a:t> = actual color (0–360 degrees)</a:t>
-            </a:r>
-          </a:p>
-          <a:p>
-            <a:pPr>
-              <a:lnSpc>
-                <a:spcPct val="105000"/>
-              </a:lnSpc>
-              <a:spcAft>
-                <a:spcPts val="600"/>
-              </a:spcAft>
-              <a:buFont typeface="Arial" panose="020B0604020202020204" pitchFamily="34" charset="0"/>
-              <a:buChar char="•"/>
-            </a:pPr>
-            <a:r>
-              <a:rPr lang="en-US" sz="1000" b="1" dirty="0"/>
-              <a:t>Saturation</a:t>
-            </a:r>
-            <a:r>
-              <a:rPr lang="en-US" sz="1000" dirty="0"/>
-              <a:t> = how pure the color is</a:t>
-            </a:r>
-          </a:p>
-          <a:p>
-            <a:pPr>
-              <a:lnSpc>
-                <a:spcPct val="105000"/>
-              </a:lnSpc>
-              <a:spcAft>
-                <a:spcPts val="600"/>
-              </a:spcAft>
-              <a:buFont typeface="Arial" panose="020B0604020202020204" pitchFamily="34" charset="0"/>
-              <a:buChar char="•"/>
-            </a:pPr>
-            <a:r>
-              <a:rPr lang="en-US" sz="1000" b="1" dirty="0"/>
-              <a:t>Value</a:t>
-            </a:r>
-            <a:r>
-              <a:rPr lang="en-US" sz="1000" dirty="0"/>
-              <a:t> = brightness</a:t>
-            </a:r>
-          </a:p>
-          <a:p>
-            <a:pPr>
-              <a:lnSpc>
-                <a:spcPct val="105000"/>
-              </a:lnSpc>
-              <a:spcAft>
-                <a:spcPts val="600"/>
-              </a:spcAft>
-              <a:buNone/>
-            </a:pPr>
-            <a:endParaRPr lang="en-US" sz="1000" b="1" dirty="0"/>
-          </a:p>
-          <a:p>
-            <a:pPr>
-              <a:lnSpc>
-                <a:spcPct val="105000"/>
-              </a:lnSpc>
-              <a:spcAft>
-                <a:spcPts val="600"/>
-              </a:spcAft>
-              <a:buNone/>
-            </a:pPr>
-            <a:r>
-              <a:rPr lang="en-US" sz="1000" b="1" dirty="0"/>
-              <a:t>🧠 Analogy:</a:t>
-            </a:r>
-          </a:p>
-          <a:p>
-            <a:pPr>
-              <a:lnSpc>
-                <a:spcPct val="105000"/>
-              </a:lnSpc>
-              <a:spcAft>
-                <a:spcPts val="600"/>
-              </a:spcAft>
-              <a:buNone/>
-            </a:pPr>
-            <a:endParaRPr lang="en-US" sz="1000" b="1" dirty="0"/>
-          </a:p>
-          <a:p>
-            <a:pPr>
-              <a:lnSpc>
-                <a:spcPct val="105000"/>
-              </a:lnSpc>
-              <a:spcAft>
-                <a:spcPts val="600"/>
-              </a:spcAft>
-              <a:buNone/>
-            </a:pPr>
-            <a:r>
-              <a:rPr lang="en-US" sz="1000" dirty="0"/>
-              <a:t>HSV is like </a:t>
-            </a:r>
-            <a:r>
-              <a:rPr lang="en-US" sz="1000" b="1" dirty="0"/>
-              <a:t>picking color in a paint app</a:t>
-            </a:r>
-            <a:r>
-              <a:rPr lang="en-US" sz="1000" dirty="0"/>
-              <a:t>:</a:t>
-            </a:r>
-          </a:p>
-          <a:p>
-            <a:pPr>
-              <a:lnSpc>
-                <a:spcPct val="105000"/>
-              </a:lnSpc>
-              <a:spcAft>
-                <a:spcPts val="600"/>
-              </a:spcAft>
-              <a:buFont typeface="Arial" panose="020B0604020202020204" pitchFamily="34" charset="0"/>
-              <a:buChar char="•"/>
-            </a:pPr>
-            <a:r>
-              <a:rPr lang="en-US" sz="1000" b="1" dirty="0"/>
-              <a:t>Hue</a:t>
-            </a:r>
-            <a:r>
-              <a:rPr lang="en-US" sz="1000" dirty="0"/>
-              <a:t> is the color wheel</a:t>
-            </a:r>
-          </a:p>
-          <a:p>
-            <a:pPr>
-              <a:lnSpc>
-                <a:spcPct val="105000"/>
-              </a:lnSpc>
-              <a:spcAft>
-                <a:spcPts val="600"/>
-              </a:spcAft>
-              <a:buFont typeface="Arial" panose="020B0604020202020204" pitchFamily="34" charset="0"/>
-              <a:buChar char="•"/>
-            </a:pPr>
-            <a:r>
-              <a:rPr lang="en-US" sz="1000" b="1" dirty="0"/>
-              <a:t>Saturation</a:t>
-            </a:r>
-            <a:r>
-              <a:rPr lang="en-US" sz="1000" dirty="0"/>
-              <a:t> is the slider for gray-to-pure</a:t>
-            </a:r>
-          </a:p>
-          <a:p>
-            <a:pPr>
-              <a:lnSpc>
-                <a:spcPct val="105000"/>
-              </a:lnSpc>
-              <a:spcAft>
-                <a:spcPts val="600"/>
-              </a:spcAft>
-              <a:buFont typeface="Arial" panose="020B0604020202020204" pitchFamily="34" charset="0"/>
-              <a:buChar char="•"/>
-            </a:pPr>
-            <a:r>
-              <a:rPr lang="en-US" sz="1000" b="1" dirty="0"/>
-              <a:t>Value</a:t>
-            </a:r>
-            <a:r>
-              <a:rPr lang="en-US" sz="1000" dirty="0"/>
-              <a:t> is how bright or dark the color is</a:t>
-            </a:r>
-          </a:p>
-          <a:p>
-            <a:pPr>
-              <a:lnSpc>
-                <a:spcPct val="105000"/>
-              </a:lnSpc>
-              <a:spcAft>
-                <a:spcPts val="600"/>
-              </a:spcAft>
-              <a:buFont typeface="Arial" panose="020B0604020202020204" pitchFamily="34" charset="0"/>
-              <a:buChar char="•"/>
-            </a:pPr>
-            <a:endParaRPr lang="en-US" sz="1000" dirty="0"/>
-          </a:p>
-          <a:p>
-            <a:pPr>
-              <a:lnSpc>
-                <a:spcPct val="105000"/>
-              </a:lnSpc>
-              <a:spcAft>
-                <a:spcPts val="600"/>
-              </a:spcAft>
-              <a:buFont typeface="Arial" panose="020B0604020202020204" pitchFamily="34" charset="0"/>
-              <a:buChar char="•"/>
-            </a:pPr>
-            <a:endParaRPr lang="en-US" sz="1000" dirty="0"/>
-          </a:p>
-          <a:p>
-            <a:pPr marL="76200" indent="0">
-              <a:lnSpc>
-                <a:spcPct val="105000"/>
-              </a:lnSpc>
-              <a:spcAft>
-                <a:spcPts val="600"/>
-              </a:spcAft>
-              <a:buNone/>
-            </a:pPr>
-            <a:r>
-              <a:rPr lang="en-US" sz="1000" dirty="0"/>
-              <a:t>HSV's </a:t>
-            </a:r>
-            <a:r>
-              <a:rPr lang="en-US" sz="1000" b="1" dirty="0"/>
-              <a:t>real benefit is not in display</a:t>
-            </a:r>
-            <a:r>
-              <a:rPr lang="en-US" sz="1000" dirty="0"/>
-              <a:t> but in </a:t>
-            </a:r>
-            <a:r>
-              <a:rPr lang="en-US" sz="1000" b="1" dirty="0"/>
-              <a:t>color filtering</a:t>
-            </a:r>
-            <a:r>
-              <a:rPr lang="en-US" sz="1000" dirty="0"/>
-              <a:t>, </a:t>
-            </a:r>
-            <a:r>
-              <a:rPr lang="en-US" sz="1000" b="1" dirty="0"/>
-              <a:t>thresholding</a:t>
-            </a:r>
-            <a:r>
-              <a:rPr lang="en-US" sz="1000" dirty="0"/>
-              <a:t>, and </a:t>
-            </a:r>
-            <a:r>
-              <a:rPr lang="en-US" sz="1000" b="1" dirty="0"/>
-              <a:t>segmentation</a:t>
-            </a:r>
-            <a:r>
-              <a:rPr lang="en-US" sz="1000" dirty="0"/>
-              <a:t>, especially for things like detecting a specific color.</a:t>
-            </a:r>
-          </a:p>
-          <a:p>
-            <a:pPr>
-              <a:lnSpc>
-                <a:spcPct val="105000"/>
-              </a:lnSpc>
-              <a:spcAft>
-                <a:spcPts val="600"/>
-              </a:spcAft>
-              <a:buFont typeface="Arial" panose="020B0604020202020204" pitchFamily="34" charset="0"/>
-              <a:buChar char="•"/>
-            </a:pPr>
-            <a:r>
-              <a:rPr lang="en-US" sz="1000" b="1" dirty="0"/>
-              <a:t>HSV</a:t>
-            </a:r>
-            <a:r>
-              <a:rPr lang="en-US" sz="1000" dirty="0"/>
-              <a:t> separates the concept of color (Hue), vibrancy (Saturation), and brightness (Value).</a:t>
-            </a:r>
-          </a:p>
-          <a:p>
-            <a:pPr>
-              <a:lnSpc>
-                <a:spcPct val="105000"/>
-              </a:lnSpc>
-              <a:spcAft>
-                <a:spcPts val="600"/>
-              </a:spcAft>
-              <a:buFont typeface="Arial" panose="020B0604020202020204" pitchFamily="34" charset="0"/>
-              <a:buChar char="•"/>
-            </a:pPr>
-            <a:r>
-              <a:rPr lang="en-US" sz="1000" dirty="0"/>
-              <a:t>HSV is more </a:t>
-            </a:r>
-            <a:r>
-              <a:rPr lang="en-US" sz="1000" b="1" dirty="0"/>
-              <a:t>aligned to how humans perceive colors</a:t>
-            </a:r>
-            <a:r>
-              <a:rPr lang="en-US" sz="1000" dirty="0"/>
-              <a:t>, which is helpful for tasks like:</a:t>
-            </a:r>
-          </a:p>
-          <a:p>
-            <a:pPr marL="742950" lvl="1" indent="-285750">
-              <a:lnSpc>
-                <a:spcPct val="105000"/>
-              </a:lnSpc>
-              <a:spcAft>
-                <a:spcPts val="600"/>
-              </a:spcAft>
-              <a:buFont typeface="Arial" panose="020B0604020202020204" pitchFamily="34" charset="0"/>
-              <a:buChar char="•"/>
-            </a:pPr>
-            <a:r>
-              <a:rPr lang="en-US" sz="1000" dirty="0"/>
-              <a:t>Detecting a red ball (by filtering hue)</a:t>
-            </a:r>
-          </a:p>
-          <a:p>
-            <a:pPr marL="742950" lvl="1" indent="-285750">
-              <a:lnSpc>
-                <a:spcPct val="105000"/>
-              </a:lnSpc>
-              <a:spcAft>
-                <a:spcPts val="600"/>
-              </a:spcAft>
-              <a:buFont typeface="Arial" panose="020B0604020202020204" pitchFamily="34" charset="0"/>
-              <a:buChar char="•"/>
-            </a:pPr>
-            <a:r>
-              <a:rPr lang="en-US" sz="1000" dirty="0"/>
-              <a:t>Enhancing low-light images (by modifying value)</a:t>
-            </a:r>
-          </a:p>
-          <a:p>
-            <a:pPr marL="76200" indent="0">
-              <a:lnSpc>
-                <a:spcPct val="105000"/>
-              </a:lnSpc>
-              <a:spcAft>
-                <a:spcPts val="600"/>
-              </a:spcAft>
-              <a:buNone/>
-            </a:pPr>
-            <a:endParaRPr lang="en-US" sz="1000" dirty="0"/>
-          </a:p>
-        </p:txBody>
-      </p:sp>
-      <p:sp>
-        <p:nvSpPr>
-          <p:cNvPr id="4" name="Slide Number Placeholder 3">
-            <a:extLst>
-              <a:ext uri="{FF2B5EF4-FFF2-40B4-BE49-F238E27FC236}">
-                <a16:creationId xmlns:a16="http://schemas.microsoft.com/office/drawing/2014/main" id="{6A61ECF1-9DDF-BE64-1F2A-16F9C3F0FEC8}"/>
-              </a:ext>
-            </a:extLst>
-          </p:cNvPr>
-          <p:cNvSpPr>
-            <a:spLocks noGrp="1"/>
-          </p:cNvSpPr>
-          <p:nvPr>
-            <p:ph type="sldNum" idx="12"/>
-          </p:nvPr>
-        </p:nvSpPr>
-        <p:spPr>
-          <a:xfrm>
-            <a:off x="11296610" y="6217622"/>
-            <a:ext cx="731700" cy="524700"/>
-          </a:xfrm>
-        </p:spPr>
-        <p:txBody>
-          <a:bodyPr wrap="square" anchor="ctr">
-            <a:normAutofit/>
-          </a:bodyPr>
-          <a:lstStyle/>
-          <a:p>
-            <a:pPr marL="0" lvl="0" indent="0" rtl="0">
-              <a:spcBef>
-                <a:spcPts val="0"/>
-              </a:spcBef>
-              <a:spcAft>
-                <a:spcPts val="600"/>
-              </a:spcAft>
-              <a:buNone/>
-            </a:pPr>
-            <a:fld id="{00000000-1234-1234-1234-123412341234}" type="slidenum">
-              <a:rPr lang="en-US" smtClean="0"/>
-              <a:pPr marL="0" lvl="0" indent="0" rtl="0">
-                <a:spcBef>
-                  <a:spcPts val="0"/>
-                </a:spcBef>
-                <a:spcAft>
-                  <a:spcPts val="600"/>
-                </a:spcAft>
-                <a:buNone/>
-              </a:pPr>
-              <a:t>30</a:t>
-            </a:fld>
-            <a:endParaRPr lang="en-US"/>
-          </a:p>
-        </p:txBody>
-      </p:sp>
-    </p:spTree>
-    <p:extLst>
-      <p:ext uri="{BB962C8B-B14F-4D97-AF65-F5344CB8AC3E}">
-        <p14:creationId xmlns:p14="http://schemas.microsoft.com/office/powerpoint/2010/main" val="2405149856"/>
-      </p:ext>
-    </p:extLst>
-  </p:cSld>
-  <p:clrMapOvr>
-    <a:masterClrMapping/>
-  </p:clrMapOvr>
-</p:sld>
-</file>
-
-<file path=ppt/slides/slide31.xml><?xml version="1.0" encoding="utf-8"?>
-<p:sld xmlns:a="http://schemas.openxmlformats.org/drawingml/2006/main" xmlns:r="http://schemas.openxmlformats.org/officeDocument/2006/relationships" xmlns:p="http://schemas.openxmlformats.org/presentationml/2006/main">
-  <p:cSld>
-    <p:spTree>
-      <p:nvGrpSpPr>
-        <p:cNvPr id="1" name=""/>
-        <p:cNvGrpSpPr/>
-        <p:nvPr/>
-      </p:nvGrpSpPr>
-      <p:grpSpPr>
-        <a:xfrm>
-          <a:off x="0" y="0"/>
-          <a:ext cx="0" cy="0"/>
-          <a:chOff x="0" y="0"/>
-          <a:chExt cx="0" cy="0"/>
-        </a:xfrm>
-      </p:grpSpPr>
-      <p:sp>
-        <p:nvSpPr>
-          <p:cNvPr id="3" name="Slide Number Placeholder 2">
-            <a:extLst>
-              <a:ext uri="{FF2B5EF4-FFF2-40B4-BE49-F238E27FC236}">
-                <a16:creationId xmlns:a16="http://schemas.microsoft.com/office/drawing/2014/main" id="{57BA24A8-CCBF-A300-9BFC-79054C4B4973}"/>
-              </a:ext>
-            </a:extLst>
-          </p:cNvPr>
-          <p:cNvSpPr>
-            <a:spLocks noGrp="1"/>
-          </p:cNvSpPr>
-          <p:nvPr>
-            <p:ph type="sldNum" idx="12"/>
-          </p:nvPr>
-        </p:nvSpPr>
-        <p:spPr/>
-        <p:txBody>
-          <a:bodyPr/>
-          <a:lstStyle/>
-          <a:p>
-            <a:pPr marL="0" lvl="0" indent="0" algn="r" rtl="0">
-              <a:spcBef>
-                <a:spcPts val="0"/>
-              </a:spcBef>
-              <a:spcAft>
-                <a:spcPts val="0"/>
-              </a:spcAft>
-              <a:buNone/>
-            </a:pPr>
-            <a:fld id="{00000000-1234-1234-1234-123412341234}" type="slidenum">
-              <a:rPr lang="en-US" smtClean="0"/>
-              <a:t>31</a:t>
-            </a:fld>
-            <a:endParaRPr lang="en-US"/>
-          </a:p>
-        </p:txBody>
-      </p:sp>
-      <p:sp>
-        <p:nvSpPr>
-          <p:cNvPr id="5" name="TextBox 4">
-            <a:extLst>
-              <a:ext uri="{FF2B5EF4-FFF2-40B4-BE49-F238E27FC236}">
-                <a16:creationId xmlns:a16="http://schemas.microsoft.com/office/drawing/2014/main" id="{03A9F4CA-CFC4-D3A0-4F26-793FE5A5EF8B}"/>
-              </a:ext>
-            </a:extLst>
-          </p:cNvPr>
-          <p:cNvSpPr txBox="1"/>
-          <p:nvPr/>
-        </p:nvSpPr>
-        <p:spPr>
-          <a:xfrm>
-            <a:off x="462455" y="591605"/>
-            <a:ext cx="10531366" cy="2893100"/>
-          </a:xfrm>
-          <a:prstGeom prst="rect">
-            <a:avLst/>
-          </a:prstGeom>
-          <a:noFill/>
-        </p:spPr>
-        <p:txBody>
-          <a:bodyPr wrap="square">
-            <a:spAutoFit/>
-          </a:bodyPr>
-          <a:lstStyle/>
-          <a:p>
-            <a:r>
-              <a:rPr lang="en-US" b="1" dirty="0"/>
-              <a:t>Hue</a:t>
-            </a:r>
-            <a:r>
-              <a:rPr lang="en-US" dirty="0"/>
-              <a:t> in HSV directly represents color — </a:t>
-            </a:r>
-            <a:r>
-              <a:rPr lang="en-US" b="1" dirty="0"/>
-              <a:t>and red is at the ends of the Hue scale</a:t>
-            </a:r>
-            <a:r>
-              <a:rPr lang="en-US" dirty="0"/>
-              <a:t> (around 0° and 180°).</a:t>
-            </a:r>
-          </a:p>
-          <a:p>
-            <a:pPr>
-              <a:buNone/>
-            </a:pPr>
-            <a:endParaRPr lang="en-US" b="1" dirty="0"/>
-          </a:p>
-          <a:p>
-            <a:pPr>
-              <a:buNone/>
-            </a:pPr>
-            <a:endParaRPr lang="en-US" b="1" dirty="0"/>
-          </a:p>
-          <a:p>
-            <a:pPr>
-              <a:buNone/>
-            </a:pPr>
-            <a:r>
-              <a:rPr lang="en-US" b="1" dirty="0"/>
-              <a:t>HSV Range: [H, S, V]</a:t>
-            </a:r>
-          </a:p>
-          <a:p>
-            <a:pPr>
-              <a:buFont typeface="Arial" panose="020B0604020202020204" pitchFamily="34" charset="0"/>
-              <a:buChar char="•"/>
-            </a:pPr>
-            <a:r>
-              <a:rPr lang="en-US" dirty="0"/>
-              <a:t>Hue: 0–179 in OpenCV (not 0–360!)</a:t>
-            </a:r>
-          </a:p>
-          <a:p>
-            <a:pPr>
-              <a:buFont typeface="Arial" panose="020B0604020202020204" pitchFamily="34" charset="0"/>
-              <a:buChar char="•"/>
-            </a:pPr>
-            <a:r>
-              <a:rPr lang="en-US" dirty="0"/>
-              <a:t>Saturation: 0–255 (how vibrant)</a:t>
-            </a:r>
-          </a:p>
-          <a:p>
-            <a:pPr>
-              <a:buFont typeface="Arial" panose="020B0604020202020204" pitchFamily="34" charset="0"/>
-              <a:buChar char="•"/>
-            </a:pPr>
-            <a:r>
-              <a:rPr lang="en-US" dirty="0"/>
-              <a:t>Value: 0–255 (brightness)</a:t>
-            </a:r>
-          </a:p>
-          <a:p>
-            <a:endParaRPr lang="en-US" dirty="0"/>
-          </a:p>
-          <a:p>
-            <a:pPr>
-              <a:buNone/>
-            </a:pPr>
-            <a:r>
-              <a:rPr lang="en-US" dirty="0"/>
-              <a:t>Red wraps around the HSV hue wheel. So in OpenCV:</a:t>
-            </a:r>
-          </a:p>
-          <a:p>
-            <a:pPr>
-              <a:buFont typeface="Arial" panose="020B0604020202020204" pitchFamily="34" charset="0"/>
-              <a:buChar char="•"/>
-            </a:pPr>
-            <a:r>
-              <a:rPr lang="en-US" dirty="0"/>
-              <a:t>Some red tones are near </a:t>
-            </a:r>
-            <a:r>
-              <a:rPr lang="en-US" b="1" dirty="0"/>
-              <a:t>0–10</a:t>
-            </a:r>
-            <a:endParaRPr lang="en-US" dirty="0"/>
-          </a:p>
-          <a:p>
-            <a:pPr>
-              <a:buFont typeface="Arial" panose="020B0604020202020204" pitchFamily="34" charset="0"/>
-              <a:buChar char="•"/>
-            </a:pPr>
-            <a:r>
-              <a:rPr lang="en-US" dirty="0"/>
-              <a:t>Others are near </a:t>
-            </a:r>
-            <a:r>
-              <a:rPr lang="en-US" b="1" dirty="0"/>
-              <a:t>160–180</a:t>
-            </a:r>
-            <a:endParaRPr lang="en-US" dirty="0"/>
-          </a:p>
-          <a:p>
-            <a:endParaRPr lang="en-US" dirty="0"/>
-          </a:p>
-          <a:p>
-            <a:endParaRPr lang="en-US" dirty="0"/>
-          </a:p>
-        </p:txBody>
-      </p:sp>
-      <p:graphicFrame>
-        <p:nvGraphicFramePr>
-          <p:cNvPr id="6" name="Table 5">
-            <a:extLst>
-              <a:ext uri="{FF2B5EF4-FFF2-40B4-BE49-F238E27FC236}">
-                <a16:creationId xmlns:a16="http://schemas.microsoft.com/office/drawing/2014/main" id="{9C0D535D-80A4-93E4-B62E-EAA6E537EAAE}"/>
-              </a:ext>
-            </a:extLst>
-          </p:cNvPr>
-          <p:cNvGraphicFramePr>
-            <a:graphicFrameLocks noGrp="1"/>
-          </p:cNvGraphicFramePr>
-          <p:nvPr>
-            <p:extLst>
-              <p:ext uri="{D42A27DB-BD31-4B8C-83A1-F6EECF244321}">
-                <p14:modId xmlns:p14="http://schemas.microsoft.com/office/powerpoint/2010/main" val="3243041438"/>
-              </p:ext>
-            </p:extLst>
-          </p:nvPr>
-        </p:nvGraphicFramePr>
-        <p:xfrm>
-          <a:off x="369395" y="3027505"/>
-          <a:ext cx="11360150" cy="914400"/>
-        </p:xfrm>
-        <a:graphic>
-          <a:graphicData uri="http://schemas.openxmlformats.org/drawingml/2006/table">
-            <a:tbl>
-              <a:tblPr/>
-              <a:tblGrid>
-                <a:gridCol w="5680075">
-                  <a:extLst>
-                    <a:ext uri="{9D8B030D-6E8A-4147-A177-3AD203B41FA5}">
-                      <a16:colId xmlns:a16="http://schemas.microsoft.com/office/drawing/2014/main" val="2256621888"/>
-                    </a:ext>
-                  </a:extLst>
-                </a:gridCol>
-                <a:gridCol w="5680075">
-                  <a:extLst>
-                    <a:ext uri="{9D8B030D-6E8A-4147-A177-3AD203B41FA5}">
-                      <a16:colId xmlns:a16="http://schemas.microsoft.com/office/drawing/2014/main" val="3157577371"/>
-                    </a:ext>
-                  </a:extLst>
-                </a:gridCol>
-              </a:tblGrid>
-              <a:tr h="0">
-                <a:tc>
-                  <a:txBody>
-                    <a:bodyPr/>
-                    <a:lstStyle/>
-                    <a:p>
-                      <a:r>
-                        <a:rPr lang="en-US">
-                          <a:highlight>
-                            <a:srgbClr val="FFFF00"/>
-                          </a:highlight>
-                        </a:rPr>
-                        <a:t>Real Hue (Degrees)</a:t>
-                      </a:r>
-                    </a:p>
-                  </a:txBody>
-                  <a:tcPr anchor="ctr">
-                    <a:lnL>
-                      <a:noFill/>
-                    </a:lnL>
-                    <a:lnR>
-                      <a:noFill/>
-                    </a:lnR>
-                    <a:lnT>
-                      <a:noFill/>
-                    </a:lnT>
-                    <a:lnB>
-                      <a:noFill/>
-                    </a:lnB>
-                    <a:noFill/>
-                  </a:tcPr>
-                </a:tc>
-                <a:tc>
-                  <a:txBody>
-                    <a:bodyPr/>
-                    <a:lstStyle/>
-                    <a:p>
-                      <a:r>
-                        <a:rPr lang="en-US">
-                          <a:highlight>
-                            <a:srgbClr val="FFFF00"/>
-                          </a:highlight>
-                        </a:rPr>
-                        <a:t>OpenCV Hue Value</a:t>
-                      </a:r>
-                    </a:p>
-                  </a:txBody>
-                  <a:tcPr anchor="ctr">
-                    <a:lnL>
-                      <a:noFill/>
-                    </a:lnL>
-                    <a:lnR>
-                      <a:noFill/>
-                    </a:lnR>
-                    <a:lnT>
-                      <a:noFill/>
-                    </a:lnT>
-                    <a:lnB>
-                      <a:noFill/>
-                    </a:lnB>
-                    <a:noFill/>
-                  </a:tcPr>
-                </a:tc>
-                <a:extLst>
-                  <a:ext uri="{0D108BD9-81ED-4DB2-BD59-A6C34878D82A}">
-                    <a16:rowId xmlns:a16="http://schemas.microsoft.com/office/drawing/2014/main" val="1530951114"/>
-                  </a:ext>
-                </a:extLst>
-              </a:tr>
-              <a:tr h="0">
-                <a:tc>
-                  <a:txBody>
-                    <a:bodyPr/>
-                    <a:lstStyle/>
-                    <a:p>
-                      <a:r>
-                        <a:rPr lang="en-US" dirty="0">
-                          <a:highlight>
-                            <a:srgbClr val="FFFF00"/>
-                          </a:highlight>
-                        </a:rPr>
-                        <a:t>0° (Red)</a:t>
-                      </a:r>
-                    </a:p>
-                  </a:txBody>
-                  <a:tcPr anchor="ctr">
-                    <a:lnL>
-                      <a:noFill/>
-                    </a:lnL>
-                    <a:lnR>
-                      <a:noFill/>
-                    </a:lnR>
-                    <a:lnT>
-                      <a:noFill/>
-                    </a:lnT>
-                    <a:lnB>
-                      <a:noFill/>
-                    </a:lnB>
-                    <a:noFill/>
-                  </a:tcPr>
-                </a:tc>
-                <a:tc>
-                  <a:txBody>
-                    <a:bodyPr/>
-                    <a:lstStyle/>
-                    <a:p>
-                      <a:r>
-                        <a:rPr lang="en-US">
-                          <a:highlight>
-                            <a:srgbClr val="FFFF00"/>
-                          </a:highlight>
-                        </a:rPr>
-                        <a:t>0</a:t>
-                      </a:r>
-                    </a:p>
-                  </a:txBody>
-                  <a:tcPr anchor="ctr">
-                    <a:lnL>
-                      <a:noFill/>
-                    </a:lnL>
-                    <a:lnR>
-                      <a:noFill/>
-                    </a:lnR>
-                    <a:lnT>
-                      <a:noFill/>
-                    </a:lnT>
-                    <a:lnB>
-                      <a:noFill/>
-                    </a:lnB>
-                    <a:noFill/>
-                  </a:tcPr>
-                </a:tc>
-                <a:extLst>
-                  <a:ext uri="{0D108BD9-81ED-4DB2-BD59-A6C34878D82A}">
-                    <a16:rowId xmlns:a16="http://schemas.microsoft.com/office/drawing/2014/main" val="324296876"/>
-                  </a:ext>
-                </a:extLst>
-              </a:tr>
-              <a:tr h="0">
-                <a:tc>
-                  <a:txBody>
-                    <a:bodyPr/>
-                    <a:lstStyle/>
-                    <a:p>
-                      <a:r>
-                        <a:rPr lang="en-US">
-                          <a:highlight>
-                            <a:srgbClr val="FFFF00"/>
-                          </a:highlight>
-                        </a:rPr>
-                        <a:t>360° (Red again)</a:t>
-                      </a:r>
-                    </a:p>
-                  </a:txBody>
-                  <a:tcPr anchor="ctr">
-                    <a:lnL>
-                      <a:noFill/>
-                    </a:lnL>
-                    <a:lnR>
-                      <a:noFill/>
-                    </a:lnR>
-                    <a:lnT>
-                      <a:noFill/>
-                    </a:lnT>
-                    <a:lnB>
-                      <a:noFill/>
-                    </a:lnB>
-                    <a:noFill/>
-                  </a:tcPr>
-                </a:tc>
-                <a:tc>
-                  <a:txBody>
-                    <a:bodyPr/>
-                    <a:lstStyle/>
-                    <a:p>
-                      <a:r>
-                        <a:rPr lang="en-US" dirty="0">
-                          <a:highlight>
-                            <a:srgbClr val="FFFF00"/>
-                          </a:highlight>
-                        </a:rPr>
-                        <a:t>179</a:t>
-                      </a:r>
-                    </a:p>
-                  </a:txBody>
-                  <a:tcPr anchor="ctr">
-                    <a:lnL>
-                      <a:noFill/>
-                    </a:lnL>
-                    <a:lnR>
-                      <a:noFill/>
-                    </a:lnR>
-                    <a:lnT>
-                      <a:noFill/>
-                    </a:lnT>
-                    <a:lnB>
-                      <a:noFill/>
-                    </a:lnB>
-                    <a:noFill/>
-                  </a:tcPr>
-                </a:tc>
-                <a:extLst>
-                  <a:ext uri="{0D108BD9-81ED-4DB2-BD59-A6C34878D82A}">
-                    <a16:rowId xmlns:a16="http://schemas.microsoft.com/office/drawing/2014/main" val="3492998471"/>
-                  </a:ext>
-                </a:extLst>
-              </a:tr>
-            </a:tbl>
-          </a:graphicData>
-        </a:graphic>
-      </p:graphicFrame>
-      <p:sp>
-        <p:nvSpPr>
-          <p:cNvPr id="7" name="Rectangle 1">
-            <a:extLst>
-              <a:ext uri="{FF2B5EF4-FFF2-40B4-BE49-F238E27FC236}">
-                <a16:creationId xmlns:a16="http://schemas.microsoft.com/office/drawing/2014/main" id="{66C46410-1503-80BA-337D-668259970CAE}"/>
-              </a:ext>
-            </a:extLst>
-          </p:cNvPr>
-          <p:cNvSpPr>
-            <a:spLocks noChangeArrowheads="1"/>
-          </p:cNvSpPr>
-          <p:nvPr/>
-        </p:nvSpPr>
-        <p:spPr bwMode="auto">
-          <a:xfrm>
-            <a:off x="369395" y="3941905"/>
-            <a:ext cx="8555421" cy="3554819"/>
-          </a:xfrm>
-          <a:prstGeom prst="rect">
-            <a:avLst/>
-          </a:prstGeom>
-          <a:noFill/>
-          <a:ln>
-            <a:noFill/>
-          </a:ln>
-          <a:effectLst/>
-          <a:extLst>
-            <a:ext uri="{909E8E84-426E-40DD-AFC4-6F175D3DCCD1}">
-              <a14:hiddenFill xmlns:a14="http://schemas.microsoft.com/office/drawing/2010/main">
-                <a:solidFill>
-                  <a:schemeClr val="accent1"/>
-                </a:solidFill>
-              </a14:hiddenFill>
-            </a:ext>
-            <a:ext uri="{91240B29-F687-4F45-9708-019B960494DF}">
-              <a14:hiddenLine xmlns:a14="http://schemas.microsoft.com/office/drawing/2010/main" w="9525">
-                <a:solidFill>
-                  <a:schemeClr val="tx1"/>
-                </a:solidFill>
-                <a:miter lim="800000"/>
-                <a:headEnd/>
-                <a:tailEnd/>
-              </a14:hiddenLine>
-            </a:ext>
-            <a:ext uri="{AF507438-7753-43E0-B8FC-AC1667EBCBE1}">
-              <a14:hiddenEffects xmlns:a14="http://schemas.microsoft.com/office/drawing/2010/main">
-                <a:effectLst>
-                  <a:outerShdw dist="35921" dir="2700000" algn="ctr" rotWithShape="0">
-                    <a:schemeClr val="bg2"/>
-                  </a:outerShdw>
-                </a:effectLst>
-              </a14:hiddenEffects>
-            </a:ext>
-          </a:extLst>
-        </p:spPr>
-        <p:txBody>
-          <a:bodyPr vert="horz" wrap="square" lIns="91440" tIns="45720" rIns="91440" bIns="45720" numCol="1" anchor="ctr" anchorCtr="0" compatLnSpc="1">
-            <a:prstTxWarp prst="textNoShape">
-              <a:avLst/>
-            </a:prstTxWarp>
-            <a:spAutoFit/>
-          </a:bodyPr>
-          <a:lstStyle/>
-          <a:p>
-            <a:pPr marL="0" marR="0" lvl="0" indent="0" algn="l" defTabSz="914400" rtl="0" eaLnBrk="0" fontAlgn="base" latinLnBrk="0" hangingPunct="0">
-              <a:lnSpc>
-                <a:spcPct val="100000"/>
-              </a:lnSpc>
-              <a:spcBef>
-                <a:spcPct val="0"/>
-              </a:spcBef>
-              <a:spcAft>
-                <a:spcPct val="0"/>
-              </a:spcAft>
-              <a:buClrTx/>
-              <a:buSzTx/>
-              <a:buFontTx/>
-              <a:buNone/>
-              <a:tabLst/>
-            </a:pPr>
-            <a:r>
-              <a:rPr kumimoji="0" lang="en-US" altLang="en-US" sz="1500" b="0" i="0" u="none" strike="noStrike" cap="none" normalizeH="0" baseline="0" dirty="0">
-                <a:ln>
-                  <a:noFill/>
-                </a:ln>
-                <a:solidFill>
-                  <a:schemeClr val="tx1"/>
-                </a:solidFill>
-                <a:effectLst/>
-                <a:latin typeface="Arial Unicode MS"/>
-              </a:rPr>
-              <a:t>[0, 100, 100]</a:t>
-            </a:r>
-            <a:r>
-              <a:rPr kumimoji="0" lang="en-US" altLang="en-US" sz="1500" b="0" i="0" u="none" strike="noStrike" cap="none" normalizeH="0" baseline="0" dirty="0">
-                <a:ln>
-                  <a:noFill/>
-                </a:ln>
-                <a:solidFill>
-                  <a:schemeClr val="tx1"/>
-                </a:solidFill>
-                <a:effectLst/>
-              </a:rPr>
-              <a:t> = Red hue, medium saturation, medium brightness</a:t>
-            </a:r>
-            <a:br>
-              <a:rPr kumimoji="0" lang="en-US" altLang="en-US" sz="1500" b="0" i="0" u="none" strike="noStrike" cap="none" normalizeH="0" baseline="0" dirty="0">
-                <a:ln>
-                  <a:noFill/>
-                </a:ln>
-                <a:solidFill>
-                  <a:schemeClr val="tx1"/>
-                </a:solidFill>
-                <a:effectLst/>
-              </a:rPr>
-            </a:br>
-            <a:r>
-              <a:rPr kumimoji="0" lang="en-US" altLang="en-US" sz="1500" b="0" i="0" u="none" strike="noStrike" cap="none" normalizeH="0" baseline="0" dirty="0">
-                <a:ln>
-                  <a:noFill/>
-                </a:ln>
-                <a:solidFill>
-                  <a:schemeClr val="tx1"/>
-                </a:solidFill>
-                <a:effectLst/>
-                <a:latin typeface="Arial Unicode MS"/>
-              </a:rPr>
-              <a:t>[10, 255, 255]</a:t>
-            </a:r>
-            <a:r>
-              <a:rPr kumimoji="0" lang="en-US" altLang="en-US" sz="1500" b="0" i="0" u="none" strike="noStrike" cap="none" normalizeH="0" baseline="0" dirty="0">
-                <a:ln>
-                  <a:noFill/>
-                </a:ln>
-                <a:solidFill>
-                  <a:schemeClr val="tx1"/>
-                </a:solidFill>
-                <a:effectLst/>
-              </a:rPr>
-              <a:t> = Red-orange hue, </a:t>
-            </a:r>
-            <a:r>
-              <a:rPr kumimoji="0" lang="en-US" altLang="en-US" sz="1500" b="1" i="0" u="none" strike="noStrike" cap="none" normalizeH="0" baseline="0" dirty="0">
-                <a:ln>
-                  <a:noFill/>
-                </a:ln>
-                <a:solidFill>
-                  <a:schemeClr val="tx1"/>
-                </a:solidFill>
-                <a:effectLst/>
-                <a:latin typeface="Arial" panose="020B0604020202020204" pitchFamily="34" charset="0"/>
-              </a:rPr>
-              <a:t>very vibrant</a:t>
-            </a:r>
-            <a:r>
-              <a:rPr kumimoji="0" lang="en-US" altLang="en-US" sz="1500" b="0" i="0" u="none" strike="noStrike" cap="none" normalizeH="0" baseline="0" dirty="0">
-                <a:ln>
-                  <a:noFill/>
-                </a:ln>
-                <a:solidFill>
-                  <a:schemeClr val="tx1"/>
-                </a:solidFill>
-                <a:effectLst/>
-                <a:latin typeface="Arial" panose="020B0604020202020204" pitchFamily="34" charset="0"/>
-              </a:rPr>
-              <a:t> and </a:t>
-            </a:r>
-            <a:r>
-              <a:rPr kumimoji="0" lang="en-US" altLang="en-US" sz="1500" b="1" i="0" u="none" strike="noStrike" cap="none" normalizeH="0" baseline="0" dirty="0">
-                <a:ln>
-                  <a:noFill/>
-                </a:ln>
-                <a:solidFill>
-                  <a:schemeClr val="tx1"/>
-                </a:solidFill>
-                <a:effectLst/>
-                <a:latin typeface="Arial" panose="020B0604020202020204" pitchFamily="34" charset="0"/>
-              </a:rPr>
-              <a:t>very bright</a:t>
-            </a:r>
-          </a:p>
-          <a:p>
-            <a:pPr marL="0" marR="0" lvl="0" indent="0" algn="l" defTabSz="914400" rtl="0" eaLnBrk="0" fontAlgn="base" latinLnBrk="0" hangingPunct="0">
-              <a:lnSpc>
-                <a:spcPct val="100000"/>
-              </a:lnSpc>
-              <a:spcBef>
-                <a:spcPct val="0"/>
-              </a:spcBef>
-              <a:spcAft>
-                <a:spcPct val="0"/>
-              </a:spcAft>
-              <a:buClrTx/>
-              <a:buSzTx/>
-              <a:buFontTx/>
-              <a:buNone/>
-              <a:tabLst/>
-            </a:pPr>
-            <a:endParaRPr kumimoji="0" lang="en-US" altLang="en-US" sz="1500" b="1" i="0" u="none" strike="noStrike" cap="none" normalizeH="0" baseline="0" dirty="0">
-              <a:ln>
-                <a:noFill/>
-              </a:ln>
-              <a:solidFill>
-                <a:schemeClr val="tx1"/>
-              </a:solidFill>
-              <a:effectLst/>
-              <a:latin typeface="Arial" panose="020B0604020202020204" pitchFamily="34" charset="0"/>
-            </a:endParaRPr>
-          </a:p>
-          <a:p>
-            <a:pPr marL="0" marR="0" lvl="0" indent="0" algn="l" defTabSz="914400" rtl="0" eaLnBrk="0" fontAlgn="base" latinLnBrk="0" hangingPunct="0">
-              <a:lnSpc>
-                <a:spcPct val="100000"/>
-              </a:lnSpc>
-              <a:spcBef>
-                <a:spcPct val="0"/>
-              </a:spcBef>
-              <a:spcAft>
-                <a:spcPct val="0"/>
-              </a:spcAft>
-              <a:buClrTx/>
-              <a:buSzTx/>
-              <a:buFontTx/>
-              <a:buNone/>
-              <a:tabLst/>
-            </a:pPr>
-            <a:endParaRPr kumimoji="0" lang="en-US" altLang="en-US" sz="1500" b="1" i="0" u="none" strike="noStrike" cap="none" normalizeH="0" baseline="0" dirty="0">
-              <a:ln>
-                <a:noFill/>
-              </a:ln>
-              <a:solidFill>
-                <a:schemeClr val="tx1"/>
-              </a:solidFill>
-              <a:effectLst/>
-              <a:latin typeface="Arial" panose="020B0604020202020204" pitchFamily="34" charset="0"/>
-            </a:endParaRPr>
-          </a:p>
-          <a:p>
-            <a:pPr marL="0" marR="0" lvl="0" indent="0" algn="l" defTabSz="914400" rtl="0" eaLnBrk="0" fontAlgn="base" latinLnBrk="0" hangingPunct="0">
-              <a:lnSpc>
-                <a:spcPct val="100000"/>
-              </a:lnSpc>
-              <a:spcBef>
-                <a:spcPct val="0"/>
-              </a:spcBef>
-              <a:spcAft>
-                <a:spcPct val="0"/>
-              </a:spcAft>
-              <a:buClrTx/>
-              <a:buSzTx/>
-              <a:buFontTx/>
-              <a:buNone/>
-              <a:tabLst/>
-            </a:pPr>
-            <a:r>
-              <a:rPr lang="en-US" altLang="en-US" sz="1500" b="1" dirty="0">
-                <a:solidFill>
-                  <a:schemeClr val="tx1"/>
-                </a:solidFill>
-                <a:latin typeface="Arial" panose="020B0604020202020204" pitchFamily="34" charset="0"/>
-              </a:rPr>
-              <a:t>✅ Lower Bound: [0, 100, 100]</a:t>
-            </a:r>
-          </a:p>
-          <a:p>
-            <a:pPr marL="0" marR="0" lvl="0" indent="0" algn="l" defTabSz="914400" rtl="0" eaLnBrk="0" fontAlgn="base" latinLnBrk="0" hangingPunct="0">
-              <a:lnSpc>
-                <a:spcPct val="100000"/>
-              </a:lnSpc>
-              <a:spcBef>
-                <a:spcPct val="0"/>
-              </a:spcBef>
-              <a:spcAft>
-                <a:spcPct val="0"/>
-              </a:spcAft>
-              <a:buClrTx/>
-              <a:buSzTx/>
-              <a:buFontTx/>
-              <a:buNone/>
-              <a:tabLst/>
-            </a:pPr>
-            <a:r>
-              <a:rPr lang="en-US" altLang="en-US" sz="1500" b="1" dirty="0">
-                <a:solidFill>
-                  <a:schemeClr val="tx1"/>
-                </a:solidFill>
-                <a:latin typeface="Arial" panose="020B0604020202020204" pitchFamily="34" charset="0"/>
-              </a:rPr>
-              <a:t>Minimum Hue: 0 → red starts here</a:t>
-            </a:r>
-          </a:p>
-          <a:p>
-            <a:pPr marL="0" marR="0" lvl="0" indent="0" algn="l" defTabSz="914400" rtl="0" eaLnBrk="0" fontAlgn="base" latinLnBrk="0" hangingPunct="0">
-              <a:lnSpc>
-                <a:spcPct val="100000"/>
-              </a:lnSpc>
-              <a:spcBef>
-                <a:spcPct val="0"/>
-              </a:spcBef>
-              <a:spcAft>
-                <a:spcPct val="0"/>
-              </a:spcAft>
-              <a:buClrTx/>
-              <a:buSzTx/>
-              <a:buFontTx/>
-              <a:buNone/>
-              <a:tabLst/>
-            </a:pPr>
-            <a:r>
-              <a:rPr lang="en-US" altLang="en-US" sz="1500" b="1" dirty="0">
-                <a:solidFill>
-                  <a:schemeClr val="tx1"/>
-                </a:solidFill>
-                <a:latin typeface="Arial" panose="020B0604020202020204" pitchFamily="34" charset="0"/>
-              </a:rPr>
-              <a:t>Minimum Saturation: 100 → filters out dull, grayish tones</a:t>
-            </a:r>
-          </a:p>
-          <a:p>
-            <a:pPr marL="0" marR="0" lvl="0" indent="0" algn="l" defTabSz="914400" rtl="0" eaLnBrk="0" fontAlgn="base" latinLnBrk="0" hangingPunct="0">
-              <a:lnSpc>
-                <a:spcPct val="100000"/>
-              </a:lnSpc>
-              <a:spcBef>
-                <a:spcPct val="0"/>
-              </a:spcBef>
-              <a:spcAft>
-                <a:spcPct val="0"/>
-              </a:spcAft>
-              <a:buClrTx/>
-              <a:buSzTx/>
-              <a:buFontTx/>
-              <a:buNone/>
-              <a:tabLst/>
-            </a:pPr>
-            <a:r>
-              <a:rPr lang="en-US" altLang="en-US" sz="1500" b="1" dirty="0">
-                <a:solidFill>
-                  <a:schemeClr val="tx1"/>
-                </a:solidFill>
-                <a:latin typeface="Arial" panose="020B0604020202020204" pitchFamily="34" charset="0"/>
-              </a:rPr>
-              <a:t>Minimum Value: 100 → filters out very dark pixels</a:t>
-            </a:r>
-          </a:p>
-          <a:p>
-            <a:pPr marL="0" marR="0" lvl="0" indent="0" algn="l" defTabSz="914400" rtl="0" eaLnBrk="0" fontAlgn="base" latinLnBrk="0" hangingPunct="0">
-              <a:lnSpc>
-                <a:spcPct val="100000"/>
-              </a:lnSpc>
-              <a:spcBef>
-                <a:spcPct val="0"/>
-              </a:spcBef>
-              <a:spcAft>
-                <a:spcPct val="0"/>
-              </a:spcAft>
-              <a:buClrTx/>
-              <a:buSzTx/>
-              <a:buFontTx/>
-              <a:buNone/>
-              <a:tabLst/>
-            </a:pPr>
-            <a:endParaRPr lang="en-US" altLang="en-US" sz="1500" b="1" dirty="0">
-              <a:solidFill>
-                <a:schemeClr val="tx1"/>
-              </a:solidFill>
-              <a:latin typeface="Arial" panose="020B0604020202020204" pitchFamily="34" charset="0"/>
-            </a:endParaRPr>
-          </a:p>
-          <a:p>
-            <a:pPr marL="0" marR="0" lvl="0" indent="0" algn="l" defTabSz="914400" rtl="0" eaLnBrk="0" fontAlgn="base" latinLnBrk="0" hangingPunct="0">
-              <a:lnSpc>
-                <a:spcPct val="100000"/>
-              </a:lnSpc>
-              <a:spcBef>
-                <a:spcPct val="0"/>
-              </a:spcBef>
-              <a:spcAft>
-                <a:spcPct val="0"/>
-              </a:spcAft>
-              <a:buClrTx/>
-              <a:buSzTx/>
-              <a:buFontTx/>
-              <a:buNone/>
-              <a:tabLst/>
-            </a:pPr>
-            <a:r>
-              <a:rPr lang="en-US" altLang="en-US" sz="1500" b="1" dirty="0">
-                <a:solidFill>
-                  <a:schemeClr val="tx1"/>
-                </a:solidFill>
-                <a:latin typeface="Arial" panose="020B0604020202020204" pitchFamily="34" charset="0"/>
-              </a:rPr>
-              <a:t>✅ Upper Bound: [10, 255, 255]</a:t>
-            </a:r>
-          </a:p>
-          <a:p>
-            <a:pPr marL="0" marR="0" lvl="0" indent="0" algn="l" defTabSz="914400" rtl="0" eaLnBrk="0" fontAlgn="base" latinLnBrk="0" hangingPunct="0">
-              <a:lnSpc>
-                <a:spcPct val="100000"/>
-              </a:lnSpc>
-              <a:spcBef>
-                <a:spcPct val="0"/>
-              </a:spcBef>
-              <a:spcAft>
-                <a:spcPct val="0"/>
-              </a:spcAft>
-              <a:buClrTx/>
-              <a:buSzTx/>
-              <a:buFontTx/>
-              <a:buNone/>
-              <a:tabLst/>
-            </a:pPr>
-            <a:r>
-              <a:rPr lang="en-US" altLang="en-US" sz="1500" b="1" dirty="0">
-                <a:solidFill>
-                  <a:schemeClr val="tx1"/>
-                </a:solidFill>
-                <a:latin typeface="Arial" panose="020B0604020202020204" pitchFamily="34" charset="0"/>
-              </a:rPr>
-              <a:t>Maximum Hue: 10 → includes red to reddish-orange</a:t>
-            </a:r>
-          </a:p>
-          <a:p>
-            <a:pPr marL="0" marR="0" lvl="0" indent="0" algn="l" defTabSz="914400" rtl="0" eaLnBrk="0" fontAlgn="base" latinLnBrk="0" hangingPunct="0">
-              <a:lnSpc>
-                <a:spcPct val="100000"/>
-              </a:lnSpc>
-              <a:spcBef>
-                <a:spcPct val="0"/>
-              </a:spcBef>
-              <a:spcAft>
-                <a:spcPct val="0"/>
-              </a:spcAft>
-              <a:buClrTx/>
-              <a:buSzTx/>
-              <a:buFontTx/>
-              <a:buNone/>
-              <a:tabLst/>
-            </a:pPr>
-            <a:r>
-              <a:rPr lang="en-US" altLang="en-US" sz="1500" b="1" dirty="0">
-                <a:solidFill>
-                  <a:schemeClr val="tx1"/>
-                </a:solidFill>
-                <a:latin typeface="Arial" panose="020B0604020202020204" pitchFamily="34" charset="0"/>
-              </a:rPr>
-              <a:t>Max Saturation &amp; Brightness: 255 → allow all vivid/bright pixels</a:t>
-            </a:r>
-          </a:p>
-          <a:p>
-            <a:pPr marL="0" marR="0" lvl="0" indent="0" algn="l" defTabSz="914400" rtl="0" eaLnBrk="0" fontAlgn="base" latinLnBrk="0" hangingPunct="0">
-              <a:lnSpc>
-                <a:spcPct val="100000"/>
-              </a:lnSpc>
-              <a:spcBef>
-                <a:spcPct val="0"/>
-              </a:spcBef>
-              <a:spcAft>
-                <a:spcPct val="0"/>
-              </a:spcAft>
-              <a:buClrTx/>
-              <a:buSzTx/>
-              <a:buFontTx/>
-              <a:buNone/>
-              <a:tabLst/>
-            </a:pPr>
-            <a:endParaRPr lang="en-US" altLang="en-US" sz="1500" b="1" dirty="0">
-              <a:solidFill>
-                <a:schemeClr val="tx1"/>
-              </a:solidFill>
-              <a:latin typeface="Arial" panose="020B0604020202020204" pitchFamily="34" charset="0"/>
-            </a:endParaRPr>
-          </a:p>
-          <a:p>
-            <a:pPr marL="0" marR="0" lvl="0" indent="0" algn="l" defTabSz="914400" rtl="0" eaLnBrk="0" fontAlgn="base" latinLnBrk="0" hangingPunct="0">
-              <a:lnSpc>
-                <a:spcPct val="100000"/>
-              </a:lnSpc>
-              <a:spcBef>
-                <a:spcPct val="0"/>
-              </a:spcBef>
-              <a:spcAft>
-                <a:spcPct val="0"/>
-              </a:spcAft>
-              <a:buClrTx/>
-              <a:buSzTx/>
-              <a:buFontTx/>
-              <a:buNone/>
-              <a:tabLst/>
-            </a:pPr>
-            <a:endParaRPr lang="en-US" altLang="en-US" sz="1500" b="1" dirty="0">
-              <a:solidFill>
-                <a:schemeClr val="tx1"/>
-              </a:solidFill>
-              <a:latin typeface="Arial" panose="020B0604020202020204" pitchFamily="34" charset="0"/>
-            </a:endParaRPr>
-          </a:p>
-          <a:p>
-            <a:pPr marL="0" marR="0" lvl="0" indent="0" algn="l" defTabSz="914400" rtl="0" eaLnBrk="0" fontAlgn="base" latinLnBrk="0" hangingPunct="0">
-              <a:lnSpc>
-                <a:spcPct val="100000"/>
-              </a:lnSpc>
-              <a:spcBef>
-                <a:spcPct val="0"/>
-              </a:spcBef>
-              <a:spcAft>
-                <a:spcPct val="0"/>
-              </a:spcAft>
-              <a:buClrTx/>
-              <a:buSzTx/>
-              <a:buFontTx/>
-              <a:buNone/>
-              <a:tabLst/>
-            </a:pPr>
-            <a:endParaRPr kumimoji="0" lang="en-US" altLang="en-US" sz="1500" b="0" i="0" u="none" strike="noStrike" cap="none" normalizeH="0" baseline="0" dirty="0">
-              <a:ln>
-                <a:noFill/>
-              </a:ln>
-              <a:solidFill>
-                <a:schemeClr val="tx1"/>
-              </a:solidFill>
-              <a:effectLst/>
-              <a:latin typeface="Arial" panose="020B0604020202020204" pitchFamily="34" charset="0"/>
-            </a:endParaRPr>
-          </a:p>
-        </p:txBody>
-      </p:sp>
-    </p:spTree>
-    <p:extLst>
-      <p:ext uri="{BB962C8B-B14F-4D97-AF65-F5344CB8AC3E}">
-        <p14:creationId xmlns:p14="http://schemas.microsoft.com/office/powerpoint/2010/main" val="181395188"/>
-      </p:ext>
-    </p:extLst>
-  </p:cSld>
-  <p:clrMapOvr>
-    <a:masterClrMapping/>
-  </p:clrMapOvr>
-</p:sld>
-</file>
-
-<file path=ppt/slides/slide32.xml><?xml version="1.0" encoding="utf-8"?>
-<p:sld xmlns:a="http://schemas.openxmlformats.org/drawingml/2006/main" xmlns:r="http://schemas.openxmlformats.org/officeDocument/2006/relationships" xmlns:p="http://schemas.openxmlformats.org/presentationml/2006/main">
-  <p:cSld>
-    <p:spTree>
-      <p:nvGrpSpPr>
-        <p:cNvPr id="1" name="Shape 523"/>
-        <p:cNvGrpSpPr/>
-        <p:nvPr/>
-      </p:nvGrpSpPr>
-      <p:grpSpPr>
-        <a:xfrm>
-          <a:off x="0" y="0"/>
-          <a:ext cx="0" cy="0"/>
-          <a:chOff x="0" y="0"/>
-          <a:chExt cx="0" cy="0"/>
-        </a:xfrm>
-      </p:grpSpPr>
-      <p:sp>
-        <p:nvSpPr>
-          <p:cNvPr id="524" name="Google Shape;524;p67"/>
-          <p:cNvSpPr txBox="1">
-            <a:spLocks noGrp="1"/>
-          </p:cNvSpPr>
-          <p:nvPr>
-            <p:ph type="sldNum" idx="12"/>
-          </p:nvPr>
-        </p:nvSpPr>
-        <p:spPr>
-          <a:xfrm>
-            <a:off x="8610600" y="6356350"/>
-            <a:ext cx="2743200" cy="365100"/>
-          </a:xfrm>
-          <a:prstGeom prst="rect">
-            <a:avLst/>
-          </a:prstGeom>
-          <a:noFill/>
-          <a:ln>
-            <a:noFill/>
-          </a:ln>
-        </p:spPr>
-        <p:txBody>
-          <a:bodyPr spcFirstLastPara="1" wrap="square" lIns="91425" tIns="45700" rIns="91425" bIns="45700" anchor="ctr" anchorCtr="0">
-            <a:noAutofit/>
-          </a:bodyPr>
-          <a:lstStyle/>
-          <a:p>
-            <a:pPr marL="0" lvl="0" indent="0" algn="r" rtl="0">
-              <a:spcBef>
-                <a:spcPts val="0"/>
-              </a:spcBef>
-              <a:spcAft>
-                <a:spcPts val="0"/>
-              </a:spcAft>
-              <a:buClr>
-                <a:srgbClr val="000000"/>
-              </a:buClr>
-              <a:buSzPts val="900"/>
-              <a:buFont typeface="Arial"/>
-              <a:buNone/>
-            </a:pPr>
-            <a:fld id="{00000000-1234-1234-1234-123412341234}" type="slidenum">
-              <a:rPr lang="en-US" sz="900">
-                <a:solidFill>
-                  <a:srgbClr val="888888"/>
-                </a:solidFill>
-                <a:latin typeface="Calibri"/>
-                <a:ea typeface="Calibri"/>
-                <a:cs typeface="Calibri"/>
-                <a:sym typeface="Calibri"/>
-              </a:rPr>
-              <a:t>32</a:t>
-            </a:fld>
-            <a:endParaRPr sz="900">
-              <a:solidFill>
-                <a:srgbClr val="888888"/>
-              </a:solidFill>
-              <a:latin typeface="Calibri"/>
-              <a:ea typeface="Calibri"/>
-              <a:cs typeface="Calibri"/>
-              <a:sym typeface="Calibri"/>
-            </a:endParaRPr>
-          </a:p>
-        </p:txBody>
-      </p:sp>
-      <p:sp>
-        <p:nvSpPr>
-          <p:cNvPr id="525" name="Google Shape;525;p67"/>
-          <p:cNvSpPr txBox="1">
-            <a:spLocks noGrp="1"/>
-          </p:cNvSpPr>
-          <p:nvPr>
-            <p:ph type="body" idx="1"/>
-          </p:nvPr>
-        </p:nvSpPr>
-        <p:spPr>
-          <a:xfrm>
-            <a:off x="838200" y="1632858"/>
-            <a:ext cx="10515600" cy="4441500"/>
-          </a:xfrm>
-          <a:prstGeom prst="rect">
-            <a:avLst/>
-          </a:prstGeom>
-          <a:noFill/>
-          <a:ln>
-            <a:noFill/>
-          </a:ln>
-        </p:spPr>
-        <p:txBody>
-          <a:bodyPr spcFirstLastPara="1" wrap="square" lIns="91425" tIns="45700" rIns="91425" bIns="45700" anchor="t" anchorCtr="0">
-            <a:normAutofit/>
-          </a:bodyPr>
-          <a:lstStyle/>
-          <a:p>
-            <a:pPr marL="457200" lvl="0" indent="0" algn="l" rtl="0">
-              <a:lnSpc>
-                <a:spcPct val="100000"/>
-              </a:lnSpc>
-              <a:spcBef>
-                <a:spcPts val="1000"/>
-              </a:spcBef>
-              <a:spcAft>
-                <a:spcPts val="0"/>
-              </a:spcAft>
-              <a:buNone/>
-            </a:pPr>
-            <a:r>
-              <a:rPr lang="en-US" dirty="0"/>
-              <a:t>Digital Image Processing, Rafael C. Gonzalez &amp; Richard E woods, Third Ed, Chapter 2</a:t>
-            </a:r>
-            <a:endParaRPr dirty="0"/>
-          </a:p>
-          <a:p>
-            <a:pPr marL="914400" lvl="1" indent="-228600" algn="l" rtl="0">
-              <a:lnSpc>
-                <a:spcPct val="90000"/>
-              </a:lnSpc>
-              <a:spcBef>
-                <a:spcPts val="500"/>
-              </a:spcBef>
-              <a:spcAft>
-                <a:spcPts val="0"/>
-              </a:spcAft>
-              <a:buSzPct val="100000"/>
-              <a:buNone/>
-            </a:pPr>
-            <a:endParaRPr dirty="0"/>
-          </a:p>
-          <a:p>
-            <a:pPr marL="914400" lvl="1" indent="-228600" algn="l" rtl="0">
-              <a:lnSpc>
-                <a:spcPct val="90000"/>
-              </a:lnSpc>
-              <a:spcBef>
-                <a:spcPts val="500"/>
-              </a:spcBef>
-              <a:spcAft>
-                <a:spcPts val="0"/>
-              </a:spcAft>
-              <a:buSzPct val="100000"/>
-              <a:buNone/>
-            </a:pPr>
-            <a:endParaRPr dirty="0"/>
-          </a:p>
-          <a:p>
-            <a:pPr marL="914400" lvl="1" indent="-228600" algn="l" rtl="0">
-              <a:lnSpc>
-                <a:spcPct val="90000"/>
-              </a:lnSpc>
-              <a:spcBef>
-                <a:spcPts val="500"/>
-              </a:spcBef>
-              <a:spcAft>
-                <a:spcPts val="0"/>
-              </a:spcAft>
-              <a:buSzPct val="100000"/>
-              <a:buNone/>
-            </a:pPr>
-            <a:endParaRPr dirty="0"/>
-          </a:p>
-          <a:p>
-            <a:pPr marL="0" lvl="1" indent="0" algn="l" rtl="0">
-              <a:lnSpc>
-                <a:spcPct val="90000"/>
-              </a:lnSpc>
-              <a:spcBef>
-                <a:spcPts val="500"/>
-              </a:spcBef>
-              <a:spcAft>
-                <a:spcPts val="0"/>
-              </a:spcAft>
-              <a:buSzPct val="100000"/>
-              <a:buNone/>
-            </a:pPr>
-            <a:r>
-              <a:rPr lang="en-US" b="1" dirty="0">
-                <a:solidFill>
-                  <a:schemeClr val="dk1"/>
-                </a:solidFill>
-              </a:rPr>
-              <a:t>References for hands-on work:</a:t>
-            </a:r>
-            <a:endParaRPr b="1" dirty="0">
-              <a:solidFill>
-                <a:schemeClr val="dk1"/>
-              </a:solidFill>
-            </a:endParaRPr>
-          </a:p>
-          <a:p>
-            <a:pPr marL="457200" lvl="0" indent="-393065" algn="l" rtl="0">
-              <a:lnSpc>
-                <a:spcPct val="90000"/>
-              </a:lnSpc>
-              <a:spcBef>
-                <a:spcPts val="0"/>
-              </a:spcBef>
-              <a:spcAft>
-                <a:spcPts val="0"/>
-              </a:spcAft>
-              <a:buSzPct val="100000"/>
-              <a:buChar char="•"/>
-            </a:pPr>
-            <a:r>
-              <a:rPr lang="en-US" u="sng">
-                <a:solidFill>
-                  <a:schemeClr val="hlink"/>
-                </a:solidFill>
-                <a:hlinkClick r:id="rId3"/>
-              </a:rPr>
-              <a:t>https</a:t>
-            </a:r>
-            <a:r>
-              <a:rPr lang="en-US" u="sng" dirty="0">
-                <a:solidFill>
-                  <a:schemeClr val="hlink"/>
-                </a:solidFill>
-                <a:hlinkClick r:id="rId3"/>
-              </a:rPr>
-              <a:t>://www.kaggle.com/code/gauravduttakiit</a:t>
-            </a:r>
-            <a:r>
-              <a:rPr lang="en-US" u="sng">
-                <a:solidFill>
-                  <a:schemeClr val="hlink"/>
-                </a:solidFill>
-                <a:hlinkClick r:id="rId3"/>
-              </a:rPr>
-              <a:t>/image-processing-notebook</a:t>
-            </a:r>
-            <a:endParaRPr dirty="0"/>
-          </a:p>
-          <a:p>
-            <a:pPr marL="50800" lvl="0" indent="0" algn="l" rtl="0">
-              <a:lnSpc>
-                <a:spcPct val="100000"/>
-              </a:lnSpc>
-              <a:spcBef>
-                <a:spcPts val="1000"/>
-              </a:spcBef>
-              <a:spcAft>
-                <a:spcPts val="0"/>
-              </a:spcAft>
-              <a:buSzPct val="100000"/>
-              <a:buNone/>
-            </a:pPr>
-            <a:endParaRPr dirty="0"/>
-          </a:p>
-        </p:txBody>
-      </p:sp>
-      <p:sp>
-        <p:nvSpPr>
-          <p:cNvPr id="526" name="Google Shape;526;p67"/>
-          <p:cNvSpPr txBox="1">
-            <a:spLocks noGrp="1"/>
-          </p:cNvSpPr>
-          <p:nvPr>
-            <p:ph type="title"/>
-          </p:nvPr>
-        </p:nvSpPr>
-        <p:spPr>
-          <a:xfrm>
-            <a:off x="838200" y="365126"/>
-            <a:ext cx="10200000" cy="1027800"/>
-          </a:xfrm>
-          <a:prstGeom prst="rect">
-            <a:avLst/>
-          </a:prstGeom>
-        </p:spPr>
-        <p:txBody>
-          <a:bodyPr spcFirstLastPara="1" wrap="square" lIns="91425" tIns="45700" rIns="91425" bIns="45700" anchor="ctr" anchorCtr="0">
-            <a:normAutofit/>
-          </a:bodyPr>
-          <a:lstStyle/>
-          <a:p>
-            <a:pPr marL="457200" lvl="0" indent="0" algn="l" rtl="0">
-              <a:lnSpc>
-                <a:spcPct val="100000"/>
-              </a:lnSpc>
-              <a:spcBef>
-                <a:spcPts val="1000"/>
-              </a:spcBef>
-              <a:spcAft>
-                <a:spcPts val="0"/>
-              </a:spcAft>
-              <a:buNone/>
-            </a:pPr>
-            <a:r>
-              <a:rPr lang="en-US">
-                <a:latin typeface="Arial"/>
-                <a:ea typeface="Arial"/>
-                <a:cs typeface="Arial"/>
-                <a:sym typeface="Arial"/>
-              </a:rPr>
-              <a:t>Readings:</a:t>
-            </a:r>
-            <a:endParaRPr/>
-          </a:p>
-        </p:txBody>
-      </p:sp>
-    </p:spTree>
-  </p:cSld>
-  <p:clrMapOvr>
-    <a:masterClrMapping/>
-  </p:clrMapOvr>
-</p:sld>
-</file>
-
-<file path=ppt/slides/slide33.xml><?xml version="1.0" encoding="utf-8"?>
-<p:sld xmlns:a="http://schemas.openxmlformats.org/drawingml/2006/main" xmlns:r="http://schemas.openxmlformats.org/officeDocument/2006/relationships" xmlns:p="http://schemas.openxmlformats.org/presentationml/2006/main">
-  <p:cSld>
-    <p:spTree>
-      <p:nvGrpSpPr>
         <p:cNvPr id="1" name="Shape 530"/>
         <p:cNvGrpSpPr/>
         <p:nvPr/>
@@ -24339,7 +22222,7 @@
             </a:pPr>
             <a:fld id="{00000000-1234-1234-1234-123412341234}" type="slidenum">
               <a:rPr lang="en-US"/>
-              <a:t>33</a:t>
+              <a:t>30</a:t>
             </a:fld>
             <a:endParaRPr/>
           </a:p>

</xml_diff>